<commit_message>
Added concealing of message to honey token generator
</commit_message>
<xml_diff>
--- a/presentations/Detekcia nepovoleneho prístupu kustomizáciou nízko interaktívnych honeypotov2.pptx
+++ b/presentations/Detekcia nepovoleneho prístupu kustomizáciou nízko interaktívnych honeypotov2.pptx
@@ -5,7 +5,7 @@
     <p:sldMasterId id="2147483767" r:id="rId1"/>
   </p:sldMasterIdLst>
   <p:notesMasterIdLst>
-    <p:notesMasterId r:id="rId16"/>
+    <p:notesMasterId r:id="rId22"/>
   </p:notesMasterIdLst>
   <p:sldIdLst>
     <p:sldId id="256" r:id="rId2"/>
@@ -17,11 +17,17 @@
     <p:sldId id="280" r:id="rId8"/>
     <p:sldId id="281" r:id="rId9"/>
     <p:sldId id="282" r:id="rId10"/>
-    <p:sldId id="262" r:id="rId11"/>
-    <p:sldId id="263" r:id="rId12"/>
-    <p:sldId id="258" r:id="rId13"/>
-    <p:sldId id="265" r:id="rId14"/>
-    <p:sldId id="274" r:id="rId15"/>
+    <p:sldId id="283" r:id="rId11"/>
+    <p:sldId id="284" r:id="rId12"/>
+    <p:sldId id="285" r:id="rId13"/>
+    <p:sldId id="287" r:id="rId14"/>
+    <p:sldId id="286" r:id="rId15"/>
+    <p:sldId id="288" r:id="rId16"/>
+    <p:sldId id="262" r:id="rId17"/>
+    <p:sldId id="263" r:id="rId18"/>
+    <p:sldId id="258" r:id="rId19"/>
+    <p:sldId id="265" r:id="rId20"/>
+    <p:sldId id="274" r:id="rId21"/>
   </p:sldIdLst>
   <p:sldSz cx="12192000" cy="6858000"/>
   <p:notesSz cx="6858000" cy="9144000"/>
@@ -11832,7 +11838,7 @@
           <a:p>
             <a:fld id="{FCA34E4B-FD8B-44EC-ACC1-52060C9F50A5}" type="datetimeFigureOut">
               <a:rPr lang="sk-SK" smtClean="0"/>
-              <a:t>2. 4. 2022</a:t>
+              <a:t>16. 4. 2022</a:t>
             </a:fld>
             <a:endParaRPr lang="sk-SK"/>
           </a:p>
@@ -12821,7 +12827,7 @@
           <a:p>
             <a:fld id="{D150AA39-B59D-403E-8167-B52EA36C0242}" type="datetimeFigureOut">
               <a:rPr lang="sk-SK" smtClean="0"/>
-              <a:t>2. 4. 2022</a:t>
+              <a:t>16. 4. 2022</a:t>
             </a:fld>
             <a:endParaRPr lang="sk-SK"/>
           </a:p>
@@ -13072,7 +13078,7 @@
           <a:p>
             <a:fld id="{D150AA39-B59D-403E-8167-B52EA36C0242}" type="datetimeFigureOut">
               <a:rPr lang="sk-SK" smtClean="0"/>
-              <a:t>2. 4. 2022</a:t>
+              <a:t>16. 4. 2022</a:t>
             </a:fld>
             <a:endParaRPr lang="sk-SK"/>
           </a:p>
@@ -13386,7 +13392,7 @@
           <a:p>
             <a:fld id="{D150AA39-B59D-403E-8167-B52EA36C0242}" type="datetimeFigureOut">
               <a:rPr lang="sk-SK" smtClean="0"/>
-              <a:t>2. 4. 2022</a:t>
+              <a:t>16. 4. 2022</a:t>
             </a:fld>
             <a:endParaRPr lang="sk-SK"/>
           </a:p>
@@ -13727,7 +13733,7 @@
           <a:p>
             <a:fld id="{D150AA39-B59D-403E-8167-B52EA36C0242}" type="datetimeFigureOut">
               <a:rPr lang="sk-SK" smtClean="0"/>
-              <a:t>2. 4. 2022</a:t>
+              <a:t>16. 4. 2022</a:t>
             </a:fld>
             <a:endParaRPr lang="sk-SK"/>
           </a:p>
@@ -14041,7 +14047,7 @@
           <a:p>
             <a:fld id="{D150AA39-B59D-403E-8167-B52EA36C0242}" type="datetimeFigureOut">
               <a:rPr lang="sk-SK" smtClean="0"/>
-              <a:t>2. 4. 2022</a:t>
+              <a:t>16. 4. 2022</a:t>
             </a:fld>
             <a:endParaRPr lang="sk-SK"/>
           </a:p>
@@ -14434,7 +14440,7 @@
           <a:p>
             <a:fld id="{D150AA39-B59D-403E-8167-B52EA36C0242}" type="datetimeFigureOut">
               <a:rPr lang="sk-SK" smtClean="0"/>
-              <a:t>2. 4. 2022</a:t>
+              <a:t>16. 4. 2022</a:t>
             </a:fld>
             <a:endParaRPr lang="sk-SK"/>
           </a:p>
@@ -14604,7 +14610,7 @@
           <a:p>
             <a:fld id="{D150AA39-B59D-403E-8167-B52EA36C0242}" type="datetimeFigureOut">
               <a:rPr lang="sk-SK" smtClean="0"/>
-              <a:t>2. 4. 2022</a:t>
+              <a:t>16. 4. 2022</a:t>
             </a:fld>
             <a:endParaRPr lang="sk-SK"/>
           </a:p>
@@ -14784,7 +14790,7 @@
           <a:p>
             <a:fld id="{D150AA39-B59D-403E-8167-B52EA36C0242}" type="datetimeFigureOut">
               <a:rPr lang="sk-SK" smtClean="0"/>
-              <a:t>2. 4. 2022</a:t>
+              <a:t>16. 4. 2022</a:t>
             </a:fld>
             <a:endParaRPr lang="sk-SK"/>
           </a:p>
@@ -14960,7 +14966,7 @@
           <a:p>
             <a:fld id="{D150AA39-B59D-403E-8167-B52EA36C0242}" type="datetimeFigureOut">
               <a:rPr lang="sk-SK" smtClean="0"/>
-              <a:t>2. 4. 2022</a:t>
+              <a:t>16. 4. 2022</a:t>
             </a:fld>
             <a:endParaRPr lang="sk-SK"/>
           </a:p>
@@ -15207,7 +15213,7 @@
           <a:p>
             <a:fld id="{D150AA39-B59D-403E-8167-B52EA36C0242}" type="datetimeFigureOut">
               <a:rPr lang="sk-SK" smtClean="0"/>
-              <a:t>2. 4. 2022</a:t>
+              <a:t>16. 4. 2022</a:t>
             </a:fld>
             <a:endParaRPr lang="sk-SK"/>
           </a:p>
@@ -15439,7 +15445,7 @@
           <a:p>
             <a:fld id="{D150AA39-B59D-403E-8167-B52EA36C0242}" type="datetimeFigureOut">
               <a:rPr lang="sk-SK" smtClean="0"/>
-              <a:t>2. 4. 2022</a:t>
+              <a:t>16. 4. 2022</a:t>
             </a:fld>
             <a:endParaRPr lang="sk-SK"/>
           </a:p>
@@ -15813,7 +15819,7 @@
           <a:p>
             <a:fld id="{D150AA39-B59D-403E-8167-B52EA36C0242}" type="datetimeFigureOut">
               <a:rPr lang="sk-SK" smtClean="0"/>
-              <a:t>2. 4. 2022</a:t>
+              <a:t>16. 4. 2022</a:t>
             </a:fld>
             <a:endParaRPr lang="sk-SK"/>
           </a:p>
@@ -15936,7 +15942,7 @@
           <a:p>
             <a:fld id="{D150AA39-B59D-403E-8167-B52EA36C0242}" type="datetimeFigureOut">
               <a:rPr lang="sk-SK" smtClean="0"/>
-              <a:t>2. 4. 2022</a:t>
+              <a:t>16. 4. 2022</a:t>
             </a:fld>
             <a:endParaRPr lang="sk-SK"/>
           </a:p>
@@ -16031,7 +16037,7 @@
           <a:p>
             <a:fld id="{D150AA39-B59D-403E-8167-B52EA36C0242}" type="datetimeFigureOut">
               <a:rPr lang="sk-SK" smtClean="0"/>
-              <a:t>2. 4. 2022</a:t>
+              <a:t>16. 4. 2022</a:t>
             </a:fld>
             <a:endParaRPr lang="sk-SK"/>
           </a:p>
@@ -16286,7 +16292,7 @@
           <a:p>
             <a:fld id="{D150AA39-B59D-403E-8167-B52EA36C0242}" type="datetimeFigureOut">
               <a:rPr lang="sk-SK" smtClean="0"/>
-              <a:t>2. 4. 2022</a:t>
+              <a:t>16. 4. 2022</a:t>
             </a:fld>
             <a:endParaRPr lang="sk-SK"/>
           </a:p>
@@ -16549,7 +16555,7 @@
           <a:p>
             <a:fld id="{D150AA39-B59D-403E-8167-B52EA36C0242}" type="datetimeFigureOut">
               <a:rPr lang="sk-SK" smtClean="0"/>
-              <a:t>2. 4. 2022</a:t>
+              <a:t>16. 4. 2022</a:t>
             </a:fld>
             <a:endParaRPr lang="sk-SK"/>
           </a:p>
@@ -17292,7 +17298,7 @@
           <a:p>
             <a:fld id="{D150AA39-B59D-403E-8167-B52EA36C0242}" type="datetimeFigureOut">
               <a:rPr lang="sk-SK" smtClean="0"/>
-              <a:t>2. 4. 2022</a:t>
+              <a:t>16. 4. 2022</a:t>
             </a:fld>
             <a:endParaRPr lang="sk-SK"/>
           </a:p>
@@ -17997,6 +18003,3278 @@
           <p:cNvPr id="2" name="Nadpis 1">
             <a:extLst>
               <a:ext uri="{FF2B5EF4-FFF2-40B4-BE49-F238E27FC236}">
+                <a16:creationId xmlns:a16="http://schemas.microsoft.com/office/drawing/2014/main" id="{DB8B13FF-6D8A-4220-9B58-28BAE2A60128}"/>
+              </a:ext>
+            </a:extLst>
+          </p:cNvPr>
+          <p:cNvSpPr>
+            <a:spLocks noGrp="1"/>
+          </p:cNvSpPr>
+          <p:nvPr>
+            <p:ph type="title"/>
+          </p:nvPr>
+        </p:nvSpPr>
+        <p:spPr>
+          <a:xfrm>
+            <a:off x="603623" y="195111"/>
+            <a:ext cx="8596668" cy="1320800"/>
+          </a:xfrm>
+        </p:spPr>
+        <p:txBody>
+          <a:bodyPr>
+            <a:noAutofit/>
+          </a:bodyPr>
+          <a:lstStyle/>
+          <a:p>
+            <a:r>
+              <a:rPr lang="en-US" sz="4800" b="1" dirty="0" err="1"/>
+              <a:t>Zabezpe</a:t>
+            </a:r>
+            <a:r>
+              <a:rPr lang="sk-SK" sz="4800" b="1" dirty="0" err="1"/>
+              <a:t>čenie</a:t>
+            </a:r>
+            <a:r>
+              <a:rPr lang="en-US" sz="4800" b="1" dirty="0"/>
+              <a:t> honey </a:t>
+            </a:r>
+            <a:r>
+              <a:rPr lang="en-US" sz="4800" b="1" dirty="0" err="1"/>
+              <a:t>tokenu</a:t>
+            </a:r>
+            <a:r>
+              <a:rPr lang="en-US" sz="4800" b="1" dirty="0"/>
+              <a:t> </a:t>
+            </a:r>
+            <a:r>
+              <a:rPr lang="sk-SK" sz="4800" b="1" dirty="0"/>
+              <a:t>voči odpočúvaniu</a:t>
+            </a:r>
+          </a:p>
+        </p:txBody>
+      </p:sp>
+      <p:sp>
+        <p:nvSpPr>
+          <p:cNvPr id="4" name="BlokTextu 3">
+            <a:extLst>
+              <a:ext uri="{FF2B5EF4-FFF2-40B4-BE49-F238E27FC236}">
+                <a16:creationId xmlns:a16="http://schemas.microsoft.com/office/drawing/2014/main" id="{1B60B006-A7B5-4C87-98DB-A8E7A398B057}"/>
+              </a:ext>
+            </a:extLst>
+          </p:cNvPr>
+          <p:cNvSpPr txBox="1"/>
+          <p:nvPr/>
+        </p:nvSpPr>
+        <p:spPr>
+          <a:xfrm>
+            <a:off x="674644" y="1786365"/>
+            <a:ext cx="5699765" cy="369332"/>
+          </a:xfrm>
+          <a:prstGeom prst="rect">
+            <a:avLst/>
+          </a:prstGeom>
+          <a:noFill/>
+        </p:spPr>
+        <p:txBody>
+          <a:bodyPr wrap="none" rtlCol="0">
+            <a:spAutoFit/>
+          </a:bodyPr>
+          <a:lstStyle/>
+          <a:p>
+            <a:r>
+              <a:rPr lang="sk-SK" b="1" dirty="0"/>
+              <a:t>1. Otvorenie programu </a:t>
+            </a:r>
+            <a:r>
+              <a:rPr lang="sk-SK" b="1" dirty="0" err="1"/>
+              <a:t>Burp</a:t>
+            </a:r>
+            <a:r>
+              <a:rPr lang="sk-SK" b="1" dirty="0"/>
+              <a:t> Suite a zvolenie proxy</a:t>
+            </a:r>
+          </a:p>
+        </p:txBody>
+      </p:sp>
+      <p:pic>
+        <p:nvPicPr>
+          <p:cNvPr id="6" name="Obrázok 5">
+            <a:extLst>
+              <a:ext uri="{FF2B5EF4-FFF2-40B4-BE49-F238E27FC236}">
+                <a16:creationId xmlns:a16="http://schemas.microsoft.com/office/drawing/2014/main" id="{D488D567-903C-45C4-88D2-C0DD2DB43511}"/>
+              </a:ext>
+            </a:extLst>
+          </p:cNvPr>
+          <p:cNvPicPr>
+            <a:picLocks noChangeAspect="1"/>
+          </p:cNvPicPr>
+          <p:nvPr/>
+        </p:nvPicPr>
+        <p:blipFill>
+          <a:blip r:embed="rId2"/>
+          <a:stretch>
+            <a:fillRect/>
+          </a:stretch>
+        </p:blipFill>
+        <p:spPr>
+          <a:xfrm>
+            <a:off x="1090334" y="2238605"/>
+            <a:ext cx="9496425" cy="1628775"/>
+          </a:xfrm>
+          <a:prstGeom prst="rect">
+            <a:avLst/>
+          </a:prstGeom>
+        </p:spPr>
+      </p:pic>
+      <p:sp>
+        <p:nvSpPr>
+          <p:cNvPr id="7" name="BlokTextu 6">
+            <a:extLst>
+              <a:ext uri="{FF2B5EF4-FFF2-40B4-BE49-F238E27FC236}">
+                <a16:creationId xmlns:a16="http://schemas.microsoft.com/office/drawing/2014/main" id="{82D8AA43-EED6-4D67-92BF-478F68C19D7B}"/>
+              </a:ext>
+            </a:extLst>
+          </p:cNvPr>
+          <p:cNvSpPr txBox="1"/>
+          <p:nvPr/>
+        </p:nvSpPr>
+        <p:spPr>
+          <a:xfrm>
+            <a:off x="275208" y="4475010"/>
+            <a:ext cx="7096815" cy="369332"/>
+          </a:xfrm>
+          <a:prstGeom prst="rect">
+            <a:avLst/>
+          </a:prstGeom>
+          <a:noFill/>
+        </p:spPr>
+        <p:txBody>
+          <a:bodyPr wrap="none" rtlCol="0">
+            <a:spAutoFit/>
+          </a:bodyPr>
+          <a:lstStyle/>
+          <a:p>
+            <a:r>
+              <a:rPr lang="sk-SK" b="1" dirty="0"/>
+              <a:t>2. Otvorenie prehliadača od </a:t>
+            </a:r>
+            <a:r>
+              <a:rPr lang="sk-SK" b="1" dirty="0" err="1"/>
+              <a:t>Burp</a:t>
+            </a:r>
+            <a:r>
+              <a:rPr lang="sk-SK" b="1" dirty="0"/>
+              <a:t> Suite a načítanie hone tokenu</a:t>
+            </a:r>
+          </a:p>
+        </p:txBody>
+      </p:sp>
+      <p:sp>
+        <p:nvSpPr>
+          <p:cNvPr id="8" name="Šípka: nadol 7">
+            <a:extLst>
+              <a:ext uri="{FF2B5EF4-FFF2-40B4-BE49-F238E27FC236}">
+                <a16:creationId xmlns:a16="http://schemas.microsoft.com/office/drawing/2014/main" id="{81633ECB-CC1E-4B2D-9F2B-8FC2FC9D29C0}"/>
+              </a:ext>
+            </a:extLst>
+          </p:cNvPr>
+          <p:cNvSpPr/>
+          <p:nvPr/>
+        </p:nvSpPr>
+        <p:spPr>
+          <a:xfrm rot="8466629">
+            <a:off x="4380865" y="3776027"/>
+            <a:ext cx="701336" cy="461639"/>
+          </a:xfrm>
+          <a:prstGeom prst="downArrow">
+            <a:avLst/>
+          </a:prstGeom>
+        </p:spPr>
+        <p:style>
+          <a:lnRef idx="2">
+            <a:schemeClr val="accent4">
+              <a:shade val="50000"/>
+            </a:schemeClr>
+          </a:lnRef>
+          <a:fillRef idx="1">
+            <a:schemeClr val="accent4"/>
+          </a:fillRef>
+          <a:effectRef idx="0">
+            <a:schemeClr val="accent4"/>
+          </a:effectRef>
+          <a:fontRef idx="minor">
+            <a:schemeClr val="lt1"/>
+          </a:fontRef>
+        </p:style>
+        <p:txBody>
+          <a:bodyPr rtlCol="0" anchor="ctr"/>
+          <a:lstStyle/>
+          <a:p>
+            <a:pPr algn="ctr"/>
+            <a:endParaRPr lang="sk-SK"/>
+          </a:p>
+        </p:txBody>
+      </p:sp>
+      <p:sp>
+        <p:nvSpPr>
+          <p:cNvPr id="9" name="BlokTextu 8">
+            <a:extLst>
+              <a:ext uri="{FF2B5EF4-FFF2-40B4-BE49-F238E27FC236}">
+                <a16:creationId xmlns:a16="http://schemas.microsoft.com/office/drawing/2014/main" id="{CBCBF0F4-9D83-41F1-897B-B2A93ACD2BAF}"/>
+              </a:ext>
+            </a:extLst>
+          </p:cNvPr>
+          <p:cNvSpPr txBox="1"/>
+          <p:nvPr/>
+        </p:nvSpPr>
+        <p:spPr>
+          <a:xfrm>
+            <a:off x="4972978" y="4022770"/>
+            <a:ext cx="2159566" cy="369332"/>
+          </a:xfrm>
+          <a:prstGeom prst="rect">
+            <a:avLst/>
+          </a:prstGeom>
+          <a:noFill/>
+        </p:spPr>
+        <p:txBody>
+          <a:bodyPr wrap="none" rtlCol="0">
+            <a:spAutoFit/>
+          </a:bodyPr>
+          <a:lstStyle/>
+          <a:p>
+            <a:r>
+              <a:rPr lang="sk-SK" dirty="0"/>
+              <a:t>Mal by byť zapnutý</a:t>
+            </a:r>
+          </a:p>
+        </p:txBody>
+      </p:sp>
+      <p:pic>
+        <p:nvPicPr>
+          <p:cNvPr id="11" name="Obrázok 10">
+            <a:extLst>
+              <a:ext uri="{FF2B5EF4-FFF2-40B4-BE49-F238E27FC236}">
+                <a16:creationId xmlns:a16="http://schemas.microsoft.com/office/drawing/2014/main" id="{AE0CCD9C-A57F-4612-B60A-BA13DC0FC3FA}"/>
+              </a:ext>
+            </a:extLst>
+          </p:cNvPr>
+          <p:cNvPicPr>
+            <a:picLocks noChangeAspect="1"/>
+          </p:cNvPicPr>
+          <p:nvPr/>
+        </p:nvPicPr>
+        <p:blipFill>
+          <a:blip r:embed="rId3"/>
+          <a:stretch>
+            <a:fillRect/>
+          </a:stretch>
+        </p:blipFill>
+        <p:spPr>
+          <a:xfrm>
+            <a:off x="768161" y="4927250"/>
+            <a:ext cx="10892900" cy="1713490"/>
+          </a:xfrm>
+          <a:prstGeom prst="rect">
+            <a:avLst/>
+          </a:prstGeom>
+        </p:spPr>
+      </p:pic>
+    </p:spTree>
+    <p:extLst>
+      <p:ext uri="{BB962C8B-B14F-4D97-AF65-F5344CB8AC3E}">
+        <p14:creationId xmlns:p14="http://schemas.microsoft.com/office/powerpoint/2010/main" val="2138840137"/>
+      </p:ext>
+    </p:extLst>
+  </p:cSld>
+  <p:clrMapOvr>
+    <a:masterClrMapping/>
+  </p:clrMapOvr>
+</p:sld>
+</file>
+
+<file path=ppt/slides/slide11.xml><?xml version="1.0" encoding="utf-8"?>
+<p:sld xmlns:a="http://schemas.openxmlformats.org/drawingml/2006/main" xmlns:r="http://schemas.openxmlformats.org/officeDocument/2006/relationships" xmlns:p="http://schemas.openxmlformats.org/presentationml/2006/main">
+  <p:cSld>
+    <p:spTree>
+      <p:nvGrpSpPr>
+        <p:cNvPr id="1" name=""/>
+        <p:cNvGrpSpPr/>
+        <p:nvPr/>
+      </p:nvGrpSpPr>
+      <p:grpSpPr>
+        <a:xfrm>
+          <a:off x="0" y="0"/>
+          <a:ext cx="0" cy="0"/>
+          <a:chOff x="0" y="0"/>
+          <a:chExt cx="0" cy="0"/>
+        </a:xfrm>
+      </p:grpSpPr>
+      <p:sp>
+        <p:nvSpPr>
+          <p:cNvPr id="4" name="BlokTextu 3">
+            <a:extLst>
+              <a:ext uri="{FF2B5EF4-FFF2-40B4-BE49-F238E27FC236}">
+                <a16:creationId xmlns:a16="http://schemas.microsoft.com/office/drawing/2014/main" id="{2FDE9A53-68D6-499B-AC6A-16803B284466}"/>
+              </a:ext>
+            </a:extLst>
+          </p:cNvPr>
+          <p:cNvSpPr txBox="1"/>
+          <p:nvPr/>
+        </p:nvSpPr>
+        <p:spPr>
+          <a:xfrm>
+            <a:off x="426129" y="302505"/>
+            <a:ext cx="5897768" cy="369332"/>
+          </a:xfrm>
+          <a:prstGeom prst="rect">
+            <a:avLst/>
+          </a:prstGeom>
+          <a:noFill/>
+        </p:spPr>
+        <p:txBody>
+          <a:bodyPr wrap="none" rtlCol="0">
+            <a:spAutoFit/>
+          </a:bodyPr>
+          <a:lstStyle/>
+          <a:p>
+            <a:r>
+              <a:rPr lang="sk-SK" b="1" dirty="0"/>
+              <a:t>2. Odchytenie </a:t>
+            </a:r>
+            <a:r>
+              <a:rPr lang="sk-SK" b="1" dirty="0" err="1"/>
+              <a:t>requestu</a:t>
+            </a:r>
+            <a:r>
+              <a:rPr lang="sk-SK" b="1" dirty="0"/>
+              <a:t> logujúceho aktivitu útočníka</a:t>
+            </a:r>
+          </a:p>
+        </p:txBody>
+      </p:sp>
+      <p:pic>
+        <p:nvPicPr>
+          <p:cNvPr id="6" name="Obrázok 5">
+            <a:extLst>
+              <a:ext uri="{FF2B5EF4-FFF2-40B4-BE49-F238E27FC236}">
+                <a16:creationId xmlns:a16="http://schemas.microsoft.com/office/drawing/2014/main" id="{4FB60275-54A1-48D9-A367-C2C9C9F66FF3}"/>
+              </a:ext>
+            </a:extLst>
+          </p:cNvPr>
+          <p:cNvPicPr>
+            <a:picLocks noChangeAspect="1"/>
+          </p:cNvPicPr>
+          <p:nvPr/>
+        </p:nvPicPr>
+        <p:blipFill>
+          <a:blip r:embed="rId2"/>
+          <a:stretch>
+            <a:fillRect/>
+          </a:stretch>
+        </p:blipFill>
+        <p:spPr>
+          <a:xfrm>
+            <a:off x="2207805" y="861262"/>
+            <a:ext cx="8921628" cy="5387206"/>
+          </a:xfrm>
+          <a:prstGeom prst="rect">
+            <a:avLst/>
+          </a:prstGeom>
+        </p:spPr>
+      </p:pic>
+      <p:sp>
+        <p:nvSpPr>
+          <p:cNvPr id="7" name="Šípka: nadol 6">
+            <a:extLst>
+              <a:ext uri="{FF2B5EF4-FFF2-40B4-BE49-F238E27FC236}">
+                <a16:creationId xmlns:a16="http://schemas.microsoft.com/office/drawing/2014/main" id="{50093A7B-01C5-4519-869C-38683DE16327}"/>
+              </a:ext>
+            </a:extLst>
+          </p:cNvPr>
+          <p:cNvSpPr/>
+          <p:nvPr/>
+        </p:nvSpPr>
+        <p:spPr>
+          <a:xfrm rot="8466629">
+            <a:off x="4718216" y="6080058"/>
+            <a:ext cx="701336" cy="461639"/>
+          </a:xfrm>
+          <a:prstGeom prst="downArrow">
+            <a:avLst/>
+          </a:prstGeom>
+        </p:spPr>
+        <p:style>
+          <a:lnRef idx="2">
+            <a:schemeClr val="accent4">
+              <a:shade val="50000"/>
+            </a:schemeClr>
+          </a:lnRef>
+          <a:fillRef idx="1">
+            <a:schemeClr val="accent4"/>
+          </a:fillRef>
+          <a:effectRef idx="0">
+            <a:schemeClr val="accent4"/>
+          </a:effectRef>
+          <a:fontRef idx="minor">
+            <a:schemeClr val="lt1"/>
+          </a:fontRef>
+        </p:style>
+        <p:txBody>
+          <a:bodyPr rtlCol="0" anchor="ctr"/>
+          <a:lstStyle/>
+          <a:p>
+            <a:pPr algn="ctr"/>
+            <a:endParaRPr lang="sk-SK"/>
+          </a:p>
+        </p:txBody>
+      </p:sp>
+      <p:sp>
+        <p:nvSpPr>
+          <p:cNvPr id="8" name="BlokTextu 7">
+            <a:extLst>
+              <a:ext uri="{FF2B5EF4-FFF2-40B4-BE49-F238E27FC236}">
+                <a16:creationId xmlns:a16="http://schemas.microsoft.com/office/drawing/2014/main" id="{E0FD5D9F-92A1-4799-9602-E08D99A0E6E3}"/>
+              </a:ext>
+            </a:extLst>
+          </p:cNvPr>
+          <p:cNvSpPr txBox="1"/>
+          <p:nvPr/>
+        </p:nvSpPr>
+        <p:spPr>
+          <a:xfrm>
+            <a:off x="5344540" y="6248468"/>
+            <a:ext cx="3292889" cy="369332"/>
+          </a:xfrm>
+          <a:prstGeom prst="rect">
+            <a:avLst/>
+          </a:prstGeom>
+          <a:noFill/>
+        </p:spPr>
+        <p:txBody>
+          <a:bodyPr wrap="none" rtlCol="0">
+            <a:spAutoFit/>
+          </a:bodyPr>
+          <a:lstStyle/>
+          <a:p>
+            <a:r>
+              <a:rPr lang="sk-SK" dirty="0"/>
+              <a:t>Informácia by mala byť skrytá</a:t>
+            </a:r>
+          </a:p>
+        </p:txBody>
+      </p:sp>
+      <p:sp>
+        <p:nvSpPr>
+          <p:cNvPr id="9" name="Šípka: nadol 8">
+            <a:extLst>
+              <a:ext uri="{FF2B5EF4-FFF2-40B4-BE49-F238E27FC236}">
+                <a16:creationId xmlns:a16="http://schemas.microsoft.com/office/drawing/2014/main" id="{4388E9BE-165B-460F-B9B6-9D052BD45AC6}"/>
+              </a:ext>
+            </a:extLst>
+          </p:cNvPr>
+          <p:cNvSpPr/>
+          <p:nvPr/>
+        </p:nvSpPr>
+        <p:spPr>
+          <a:xfrm rot="8466629">
+            <a:off x="3923524" y="2054008"/>
+            <a:ext cx="701336" cy="461639"/>
+          </a:xfrm>
+          <a:prstGeom prst="downArrow">
+            <a:avLst/>
+          </a:prstGeom>
+        </p:spPr>
+        <p:style>
+          <a:lnRef idx="2">
+            <a:schemeClr val="accent4">
+              <a:shade val="50000"/>
+            </a:schemeClr>
+          </a:lnRef>
+          <a:fillRef idx="1">
+            <a:schemeClr val="accent4"/>
+          </a:fillRef>
+          <a:effectRef idx="0">
+            <a:schemeClr val="accent4"/>
+          </a:effectRef>
+          <a:fontRef idx="minor">
+            <a:schemeClr val="lt1"/>
+          </a:fontRef>
+        </p:style>
+        <p:txBody>
+          <a:bodyPr rtlCol="0" anchor="ctr"/>
+          <a:lstStyle/>
+          <a:p>
+            <a:pPr algn="ctr"/>
+            <a:endParaRPr lang="sk-SK"/>
+          </a:p>
+        </p:txBody>
+      </p:sp>
+      <p:sp>
+        <p:nvSpPr>
+          <p:cNvPr id="10" name="BlokTextu 9">
+            <a:extLst>
+              <a:ext uri="{FF2B5EF4-FFF2-40B4-BE49-F238E27FC236}">
+                <a16:creationId xmlns:a16="http://schemas.microsoft.com/office/drawing/2014/main" id="{BDCBF5CD-7172-4F5F-B5CC-6CEE40BD16A3}"/>
+              </a:ext>
+            </a:extLst>
+          </p:cNvPr>
+          <p:cNvSpPr txBox="1"/>
+          <p:nvPr/>
+        </p:nvSpPr>
+        <p:spPr>
+          <a:xfrm>
+            <a:off x="4567979" y="2315313"/>
+            <a:ext cx="4230645" cy="369332"/>
+          </a:xfrm>
+          <a:prstGeom prst="rect">
+            <a:avLst/>
+          </a:prstGeom>
+          <a:noFill/>
+        </p:spPr>
+        <p:txBody>
+          <a:bodyPr wrap="none" rtlCol="0">
+            <a:spAutoFit/>
+          </a:bodyPr>
+          <a:lstStyle/>
+          <a:p>
+            <a:r>
+              <a:rPr lang="sk-SK" b="1" dirty="0"/>
+              <a:t>Útočník môže zamedziť jej odoslaniu</a:t>
+            </a:r>
+          </a:p>
+        </p:txBody>
+      </p:sp>
+      <p:sp>
+        <p:nvSpPr>
+          <p:cNvPr id="12" name="BlokTextu 11">
+            <a:extLst>
+              <a:ext uri="{FF2B5EF4-FFF2-40B4-BE49-F238E27FC236}">
+                <a16:creationId xmlns:a16="http://schemas.microsoft.com/office/drawing/2014/main" id="{5D33BB4A-438D-461A-9C66-29B4E8D1CD7F}"/>
+              </a:ext>
+            </a:extLst>
+          </p:cNvPr>
+          <p:cNvSpPr txBox="1"/>
+          <p:nvPr/>
+        </p:nvSpPr>
+        <p:spPr>
+          <a:xfrm>
+            <a:off x="216554" y="2284827"/>
+            <a:ext cx="1991251" cy="646331"/>
+          </a:xfrm>
+          <a:prstGeom prst="rect">
+            <a:avLst/>
+          </a:prstGeom>
+          <a:noFill/>
+        </p:spPr>
+        <p:txBody>
+          <a:bodyPr wrap="none" rtlCol="0">
+            <a:spAutoFit/>
+          </a:bodyPr>
+          <a:lstStyle/>
+          <a:p>
+            <a:r>
+              <a:rPr lang="sk-SK" dirty="0"/>
+              <a:t>Odoslanie správy </a:t>
+            </a:r>
+          </a:p>
+          <a:p>
+            <a:r>
+              <a:rPr lang="sk-SK" dirty="0"/>
+              <a:t>na server</a:t>
+            </a:r>
+          </a:p>
+        </p:txBody>
+      </p:sp>
+      <p:sp>
+        <p:nvSpPr>
+          <p:cNvPr id="13" name="BlokTextu 12">
+            <a:extLst>
+              <a:ext uri="{FF2B5EF4-FFF2-40B4-BE49-F238E27FC236}">
+                <a16:creationId xmlns:a16="http://schemas.microsoft.com/office/drawing/2014/main" id="{CB2BA018-BDBE-4FDB-BD92-34906AC28A0A}"/>
+              </a:ext>
+            </a:extLst>
+          </p:cNvPr>
+          <p:cNvSpPr txBox="1"/>
+          <p:nvPr/>
+        </p:nvSpPr>
+        <p:spPr>
+          <a:xfrm>
+            <a:off x="5750353" y="2652721"/>
+            <a:ext cx="6096541" cy="369332"/>
+          </a:xfrm>
+          <a:prstGeom prst="rect">
+            <a:avLst/>
+          </a:prstGeom>
+          <a:noFill/>
+        </p:spPr>
+        <p:txBody>
+          <a:bodyPr wrap="none" rtlCol="0">
+            <a:spAutoFit/>
+          </a:bodyPr>
+          <a:lstStyle/>
+          <a:p>
+            <a:r>
+              <a:rPr lang="en-US" dirty="0"/>
+              <a:t>(</a:t>
+            </a:r>
+            <a:r>
+              <a:rPr lang="sk-SK" dirty="0"/>
+              <a:t>ak to urobí nemali by sa mu načítať fiktívne informácie</a:t>
+            </a:r>
+            <a:r>
+              <a:rPr lang="en-US" dirty="0"/>
+              <a:t>)</a:t>
+            </a:r>
+            <a:endParaRPr lang="sk-SK" dirty="0"/>
+          </a:p>
+        </p:txBody>
+      </p:sp>
+    </p:spTree>
+    <p:extLst>
+      <p:ext uri="{BB962C8B-B14F-4D97-AF65-F5344CB8AC3E}">
+        <p14:creationId xmlns:p14="http://schemas.microsoft.com/office/powerpoint/2010/main" val="3510556515"/>
+      </p:ext>
+    </p:extLst>
+  </p:cSld>
+  <p:clrMapOvr>
+    <a:masterClrMapping/>
+  </p:clrMapOvr>
+</p:sld>
+</file>
+
+<file path=ppt/slides/slide12.xml><?xml version="1.0" encoding="utf-8"?>
+<p:sld xmlns:a="http://schemas.openxmlformats.org/drawingml/2006/main" xmlns:r="http://schemas.openxmlformats.org/officeDocument/2006/relationships" xmlns:p="http://schemas.openxmlformats.org/presentationml/2006/main">
+  <p:cSld>
+    <p:spTree>
+      <p:nvGrpSpPr>
+        <p:cNvPr id="1" name=""/>
+        <p:cNvGrpSpPr/>
+        <p:nvPr/>
+      </p:nvGrpSpPr>
+      <p:grpSpPr>
+        <a:xfrm>
+          <a:off x="0" y="0"/>
+          <a:ext cx="0" cy="0"/>
+          <a:chOff x="0" y="0"/>
+          <a:chExt cx="0" cy="0"/>
+        </a:xfrm>
+      </p:grpSpPr>
+      <p:sp>
+        <p:nvSpPr>
+          <p:cNvPr id="2" name="Nadpis 1">
+            <a:extLst>
+              <a:ext uri="{FF2B5EF4-FFF2-40B4-BE49-F238E27FC236}">
+                <a16:creationId xmlns:a16="http://schemas.microsoft.com/office/drawing/2014/main" id="{CACB456F-D197-4E0E-A432-FE88ECA217F9}"/>
+              </a:ext>
+            </a:extLst>
+          </p:cNvPr>
+          <p:cNvSpPr>
+            <a:spLocks noGrp="1"/>
+          </p:cNvSpPr>
+          <p:nvPr>
+            <p:ph type="title"/>
+          </p:nvPr>
+        </p:nvSpPr>
+        <p:spPr>
+          <a:xfrm>
+            <a:off x="245089" y="273727"/>
+            <a:ext cx="10076010" cy="1320800"/>
+          </a:xfrm>
+        </p:spPr>
+        <p:txBody>
+          <a:bodyPr>
+            <a:noAutofit/>
+          </a:bodyPr>
+          <a:lstStyle/>
+          <a:p>
+            <a:r>
+              <a:rPr lang="sk-SK" sz="4800" b="1" dirty="0"/>
+              <a:t>Odmaskovanie správy na serveri</a:t>
+            </a:r>
+          </a:p>
+        </p:txBody>
+      </p:sp>
+      <p:pic>
+        <p:nvPicPr>
+          <p:cNvPr id="5" name="Obrázok 4">
+            <a:extLst>
+              <a:ext uri="{FF2B5EF4-FFF2-40B4-BE49-F238E27FC236}">
+                <a16:creationId xmlns:a16="http://schemas.microsoft.com/office/drawing/2014/main" id="{59474621-2312-40CD-AA91-FEE095FC1060}"/>
+              </a:ext>
+            </a:extLst>
+          </p:cNvPr>
+          <p:cNvPicPr>
+            <a:picLocks noChangeAspect="1"/>
+          </p:cNvPicPr>
+          <p:nvPr/>
+        </p:nvPicPr>
+        <p:blipFill>
+          <a:blip r:embed="rId2"/>
+          <a:stretch>
+            <a:fillRect/>
+          </a:stretch>
+        </p:blipFill>
+        <p:spPr>
+          <a:xfrm>
+            <a:off x="1183215" y="1258480"/>
+            <a:ext cx="10506075" cy="1771650"/>
+          </a:xfrm>
+          <a:prstGeom prst="rect">
+            <a:avLst/>
+          </a:prstGeom>
+        </p:spPr>
+      </p:pic>
+      <p:sp>
+        <p:nvSpPr>
+          <p:cNvPr id="6" name="BlokTextu 5">
+            <a:extLst>
+              <a:ext uri="{FF2B5EF4-FFF2-40B4-BE49-F238E27FC236}">
+                <a16:creationId xmlns:a16="http://schemas.microsoft.com/office/drawing/2014/main" id="{2ECFD53E-FBEC-4DDE-829B-35C4EABBD5B2}"/>
+              </a:ext>
+            </a:extLst>
+          </p:cNvPr>
+          <p:cNvSpPr txBox="1"/>
+          <p:nvPr/>
+        </p:nvSpPr>
+        <p:spPr>
+          <a:xfrm>
+            <a:off x="420624" y="4230425"/>
+            <a:ext cx="9087744" cy="1077218"/>
+          </a:xfrm>
+          <a:prstGeom prst="rect">
+            <a:avLst/>
+          </a:prstGeom>
+          <a:noFill/>
+        </p:spPr>
+        <p:txBody>
+          <a:bodyPr wrap="none" rtlCol="0">
+            <a:spAutoFit/>
+          </a:bodyPr>
+          <a:lstStyle/>
+          <a:p>
+            <a:r>
+              <a:rPr lang="sk-SK" sz="3200" b="1" dirty="0"/>
+              <a:t>Vygenerovanie </a:t>
+            </a:r>
+            <a:r>
+              <a:rPr lang="sk-SK" sz="3200" b="1" dirty="0" err="1"/>
+              <a:t>Honey</a:t>
+            </a:r>
+            <a:r>
+              <a:rPr lang="sk-SK" sz="3200" b="1" dirty="0"/>
+              <a:t> tokenu – </a:t>
+            </a:r>
+          </a:p>
+          <a:p>
+            <a:r>
+              <a:rPr lang="sk-SK" sz="3200" b="1" dirty="0"/>
+              <a:t>				odosielajúceho zamaskované správy </a:t>
+            </a:r>
+          </a:p>
+        </p:txBody>
+      </p:sp>
+      <p:sp>
+        <p:nvSpPr>
+          <p:cNvPr id="7" name="BlokTextu 6">
+            <a:extLst>
+              <a:ext uri="{FF2B5EF4-FFF2-40B4-BE49-F238E27FC236}">
+                <a16:creationId xmlns:a16="http://schemas.microsoft.com/office/drawing/2014/main" id="{5C7C2E2F-4212-47A6-9A1A-5740E339AD6E}"/>
+              </a:ext>
+            </a:extLst>
+          </p:cNvPr>
+          <p:cNvSpPr txBox="1"/>
+          <p:nvPr/>
+        </p:nvSpPr>
+        <p:spPr>
+          <a:xfrm>
+            <a:off x="808311" y="5814998"/>
+            <a:ext cx="8949566" cy="369332"/>
+          </a:xfrm>
+          <a:prstGeom prst="rect">
+            <a:avLst/>
+          </a:prstGeom>
+          <a:noFill/>
+        </p:spPr>
+        <p:txBody>
+          <a:bodyPr wrap="none" rtlCol="0">
+            <a:spAutoFit/>
+          </a:bodyPr>
+          <a:lstStyle/>
+          <a:p>
+            <a:r>
+              <a:rPr lang="sk-SK" dirty="0"/>
+              <a:t>"./</a:t>
+            </a:r>
+            <a:r>
+              <a:rPr lang="sk-SK" dirty="0" err="1"/>
+              <a:t>venv</a:t>
+            </a:r>
+            <a:r>
+              <a:rPr lang="sk-SK" dirty="0"/>
+              <a:t>/</a:t>
+            </a:r>
+            <a:r>
+              <a:rPr lang="sk-SK" dirty="0" err="1"/>
+              <a:t>Scripts</a:t>
+            </a:r>
+            <a:r>
+              <a:rPr lang="sk-SK" dirty="0"/>
+              <a:t>/python.exe“ ./honey_token_generator/honey_token_constructor.py</a:t>
+            </a:r>
+          </a:p>
+        </p:txBody>
+      </p:sp>
+      <p:sp>
+        <p:nvSpPr>
+          <p:cNvPr id="8" name="BlokTextu 7">
+            <a:extLst>
+              <a:ext uri="{FF2B5EF4-FFF2-40B4-BE49-F238E27FC236}">
+                <a16:creationId xmlns:a16="http://schemas.microsoft.com/office/drawing/2014/main" id="{F38BBEE0-242D-4C4F-AFEC-C27B0960E257}"/>
+              </a:ext>
+            </a:extLst>
+          </p:cNvPr>
+          <p:cNvSpPr txBox="1"/>
+          <p:nvPr/>
+        </p:nvSpPr>
+        <p:spPr>
+          <a:xfrm>
+            <a:off x="1691640" y="5278948"/>
+            <a:ext cx="5873724" cy="369332"/>
+          </a:xfrm>
+          <a:prstGeom prst="rect">
+            <a:avLst/>
+          </a:prstGeom>
+          <a:noFill/>
+        </p:spPr>
+        <p:txBody>
+          <a:bodyPr wrap="none" rtlCol="0">
+            <a:spAutoFit/>
+          </a:bodyPr>
+          <a:lstStyle/>
+          <a:p>
+            <a:r>
+              <a:rPr lang="sk-SK" dirty="0"/>
+              <a:t>-s predpripravenou </a:t>
+            </a:r>
+            <a:r>
+              <a:rPr lang="sk-SK" dirty="0" err="1"/>
+              <a:t>východzou</a:t>
+            </a:r>
+            <a:r>
+              <a:rPr lang="sk-SK" dirty="0"/>
+              <a:t> základnou konfiguráciou</a:t>
+            </a:r>
+          </a:p>
+        </p:txBody>
+      </p:sp>
+      <p:sp>
+        <p:nvSpPr>
+          <p:cNvPr id="9" name="BlokTextu 8">
+            <a:extLst>
+              <a:ext uri="{FF2B5EF4-FFF2-40B4-BE49-F238E27FC236}">
+                <a16:creationId xmlns:a16="http://schemas.microsoft.com/office/drawing/2014/main" id="{4CCB948C-6C5B-4EF0-8D5D-8CD5122945FB}"/>
+              </a:ext>
+            </a:extLst>
+          </p:cNvPr>
+          <p:cNvSpPr txBox="1"/>
+          <p:nvPr/>
+        </p:nvSpPr>
+        <p:spPr>
+          <a:xfrm>
+            <a:off x="7473924" y="6259892"/>
+            <a:ext cx="1585690" cy="369332"/>
+          </a:xfrm>
+          <a:prstGeom prst="rect">
+            <a:avLst/>
+          </a:prstGeom>
+          <a:noFill/>
+        </p:spPr>
+        <p:txBody>
+          <a:bodyPr wrap="none" rtlCol="0">
+            <a:spAutoFit/>
+          </a:bodyPr>
+          <a:lstStyle/>
+          <a:p>
+            <a:r>
+              <a:rPr lang="en-US" b="1" dirty="0" err="1"/>
+              <a:t>Cez</a:t>
+            </a:r>
+            <a:r>
+              <a:rPr lang="en-US" b="1" dirty="0"/>
+              <a:t> </a:t>
+            </a:r>
+            <a:r>
+              <a:rPr lang="en-US" b="1" dirty="0" err="1"/>
+              <a:t>Pycharm</a:t>
+            </a:r>
+            <a:endParaRPr lang="sk-SK" b="1" dirty="0"/>
+          </a:p>
+        </p:txBody>
+      </p:sp>
+      <p:sp>
+        <p:nvSpPr>
+          <p:cNvPr id="10" name="Šípka: nadol 9">
+            <a:extLst>
+              <a:ext uri="{FF2B5EF4-FFF2-40B4-BE49-F238E27FC236}">
+                <a16:creationId xmlns:a16="http://schemas.microsoft.com/office/drawing/2014/main" id="{FBDF084F-0DC2-4BA5-97EB-E31FDE365BA5}"/>
+              </a:ext>
+            </a:extLst>
+          </p:cNvPr>
+          <p:cNvSpPr/>
+          <p:nvPr/>
+        </p:nvSpPr>
+        <p:spPr>
+          <a:xfrm rot="19639776">
+            <a:off x="1684158" y="2837092"/>
+            <a:ext cx="701336" cy="461639"/>
+          </a:xfrm>
+          <a:prstGeom prst="downArrow">
+            <a:avLst/>
+          </a:prstGeom>
+        </p:spPr>
+        <p:style>
+          <a:lnRef idx="2">
+            <a:schemeClr val="accent4">
+              <a:shade val="50000"/>
+            </a:schemeClr>
+          </a:lnRef>
+          <a:fillRef idx="1">
+            <a:schemeClr val="accent4"/>
+          </a:fillRef>
+          <a:effectRef idx="0">
+            <a:schemeClr val="accent4"/>
+          </a:effectRef>
+          <a:fontRef idx="minor">
+            <a:schemeClr val="lt1"/>
+          </a:fontRef>
+        </p:style>
+        <p:txBody>
+          <a:bodyPr rtlCol="0" anchor="ctr"/>
+          <a:lstStyle/>
+          <a:p>
+            <a:pPr algn="ctr"/>
+            <a:endParaRPr lang="sk-SK"/>
+          </a:p>
+        </p:txBody>
+      </p:sp>
+      <p:sp>
+        <p:nvSpPr>
+          <p:cNvPr id="11" name="BlokTextu 10">
+            <a:extLst>
+              <a:ext uri="{FF2B5EF4-FFF2-40B4-BE49-F238E27FC236}">
+                <a16:creationId xmlns:a16="http://schemas.microsoft.com/office/drawing/2014/main" id="{145B2805-8ED2-4F76-92B7-23C5FCC3B377}"/>
+              </a:ext>
+            </a:extLst>
+          </p:cNvPr>
+          <p:cNvSpPr txBox="1"/>
+          <p:nvPr/>
+        </p:nvSpPr>
+        <p:spPr>
+          <a:xfrm>
+            <a:off x="2340864" y="3220132"/>
+            <a:ext cx="5754139" cy="646331"/>
+          </a:xfrm>
+          <a:prstGeom prst="rect">
+            <a:avLst/>
+          </a:prstGeom>
+          <a:noFill/>
+        </p:spPr>
+        <p:txBody>
+          <a:bodyPr wrap="none" rtlCol="0">
+            <a:spAutoFit/>
+          </a:bodyPr>
+          <a:lstStyle/>
+          <a:p>
+            <a:r>
+              <a:rPr lang="sk-SK" dirty="0"/>
+              <a:t>Viacnásobné aplikovanie maskovacích metód výrazne </a:t>
+            </a:r>
+          </a:p>
+          <a:p>
+            <a:r>
+              <a:rPr lang="sk-SK" dirty="0"/>
+              <a:t>predlžuje maskovanú správu oproti originálu</a:t>
+            </a:r>
+          </a:p>
+        </p:txBody>
+      </p:sp>
+    </p:spTree>
+    <p:extLst>
+      <p:ext uri="{BB962C8B-B14F-4D97-AF65-F5344CB8AC3E}">
+        <p14:creationId xmlns:p14="http://schemas.microsoft.com/office/powerpoint/2010/main" val="433503483"/>
+      </p:ext>
+    </p:extLst>
+  </p:cSld>
+  <p:clrMapOvr>
+    <a:masterClrMapping/>
+  </p:clrMapOvr>
+</p:sld>
+</file>
+
+<file path=ppt/slides/slide13.xml><?xml version="1.0" encoding="utf-8"?>
+<p:sld xmlns:a="http://schemas.openxmlformats.org/drawingml/2006/main" xmlns:r="http://schemas.openxmlformats.org/officeDocument/2006/relationships" xmlns:p="http://schemas.openxmlformats.org/presentationml/2006/main">
+  <p:cSld>
+    <p:spTree>
+      <p:nvGrpSpPr>
+        <p:cNvPr id="1" name=""/>
+        <p:cNvGrpSpPr/>
+        <p:nvPr/>
+      </p:nvGrpSpPr>
+      <p:grpSpPr>
+        <a:xfrm>
+          <a:off x="0" y="0"/>
+          <a:ext cx="0" cy="0"/>
+          <a:chOff x="0" y="0"/>
+          <a:chExt cx="0" cy="0"/>
+        </a:xfrm>
+      </p:grpSpPr>
+      <p:sp>
+        <p:nvSpPr>
+          <p:cNvPr id="3" name="Zástupný objekt pre obsah 2">
+            <a:extLst>
+              <a:ext uri="{FF2B5EF4-FFF2-40B4-BE49-F238E27FC236}">
+                <a16:creationId xmlns:a16="http://schemas.microsoft.com/office/drawing/2014/main" id="{C8B5FCE9-6A82-4DF4-9ADE-94045586828B}"/>
+              </a:ext>
+            </a:extLst>
+          </p:cNvPr>
+          <p:cNvSpPr>
+            <a:spLocks noGrp="1"/>
+          </p:cNvSpPr>
+          <p:nvPr>
+            <p:ph idx="1"/>
+          </p:nvPr>
+        </p:nvSpPr>
+        <p:spPr>
+          <a:xfrm>
+            <a:off x="695622" y="2564383"/>
+            <a:ext cx="8596668" cy="5547586"/>
+          </a:xfrm>
+        </p:spPr>
+        <p:txBody>
+          <a:bodyPr>
+            <a:normAutofit/>
+          </a:bodyPr>
+          <a:lstStyle/>
+          <a:p>
+            <a:r>
+              <a:rPr lang="sk-SK" dirty="0" err="1"/>
+              <a:t>function</a:t>
+            </a:r>
+            <a:r>
+              <a:rPr lang="sk-SK" dirty="0"/>
+              <a:t> </a:t>
+            </a:r>
+            <a:r>
+              <a:rPr lang="sk-SK" dirty="0" err="1"/>
+              <a:t>aa</a:t>
+            </a:r>
+            <a:r>
+              <a:rPr lang="sk-SK" dirty="0"/>
+              <a:t>(){</a:t>
+            </a:r>
+          </a:p>
+          <a:p>
+            <a:r>
+              <a:rPr lang="sk-SK" dirty="0"/>
+              <a:t>let </a:t>
+            </a:r>
+            <a:r>
+              <a:rPr lang="sk-SK" dirty="0" err="1"/>
+              <a:t>data</a:t>
+            </a:r>
+            <a:r>
+              <a:rPr lang="sk-SK" dirty="0"/>
+              <a:t> = {element: &lt;&lt;[</a:t>
+            </a:r>
+            <a:r>
+              <a:rPr lang="sk-SK" dirty="0" err="1"/>
+              <a:t>data</a:t>
+            </a:r>
+            <a:r>
+              <a:rPr lang="sk-SK" dirty="0"/>
+              <a:t>]&gt;&gt;};</a:t>
+            </a:r>
+          </a:p>
+          <a:p>
+            <a:r>
+              <a:rPr lang="sk-SK" dirty="0" err="1"/>
+              <a:t>fetch</a:t>
+            </a:r>
+            <a:r>
+              <a:rPr lang="sk-SK" dirty="0"/>
+              <a:t>("http://localhost:5001/</a:t>
+            </a:r>
+            <a:r>
+              <a:rPr lang="sk-SK" dirty="0" err="1"/>
+              <a:t>input</a:t>
+            </a:r>
+            <a:r>
+              <a:rPr lang="sk-SK" dirty="0"/>
+              <a:t>", {</a:t>
+            </a:r>
+          </a:p>
+          <a:p>
+            <a:r>
+              <a:rPr lang="sk-SK" dirty="0"/>
+              <a:t>	</a:t>
+            </a:r>
+            <a:r>
+              <a:rPr lang="sk-SK" dirty="0" err="1"/>
+              <a:t>method</a:t>
+            </a:r>
+            <a:r>
+              <a:rPr lang="sk-SK" dirty="0"/>
+              <a:t>: "POST",</a:t>
+            </a:r>
+          </a:p>
+          <a:p>
+            <a:r>
+              <a:rPr lang="sk-SK" dirty="0"/>
+              <a:t>	</a:t>
+            </a:r>
+            <a:r>
+              <a:rPr lang="sk-SK" dirty="0" err="1"/>
+              <a:t>headers</a:t>
+            </a:r>
+            <a:r>
+              <a:rPr lang="sk-SK" dirty="0"/>
+              <a:t>: {'</a:t>
+            </a:r>
+            <a:r>
+              <a:rPr lang="sk-SK" dirty="0" err="1"/>
+              <a:t>Content</a:t>
+            </a:r>
+            <a:r>
+              <a:rPr lang="sk-SK" dirty="0"/>
+              <a:t>-Type': '</a:t>
+            </a:r>
+            <a:r>
+              <a:rPr lang="sk-SK" dirty="0" err="1"/>
+              <a:t>application</a:t>
+            </a:r>
+            <a:r>
+              <a:rPr lang="sk-SK" dirty="0"/>
+              <a:t>/</a:t>
+            </a:r>
+            <a:r>
+              <a:rPr lang="sk-SK" dirty="0" err="1"/>
+              <a:t>json</a:t>
+            </a:r>
+            <a:r>
+              <a:rPr lang="sk-SK" dirty="0"/>
+              <a:t>', 'set-</a:t>
+            </a:r>
+            <a:r>
+              <a:rPr lang="sk-SK" dirty="0" err="1"/>
+              <a:t>cookie</a:t>
+            </a:r>
+            <a:r>
+              <a:rPr lang="sk-SK" dirty="0"/>
+              <a:t>': "My </a:t>
+            </a:r>
+            <a:r>
+              <a:rPr lang="sk-SK" dirty="0" err="1"/>
+              <a:t>cookie</a:t>
+            </a:r>
+            <a:r>
+              <a:rPr lang="sk-SK" dirty="0"/>
+              <a:t>"}, </a:t>
+            </a:r>
+          </a:p>
+          <a:p>
+            <a:r>
+              <a:rPr lang="sk-SK" dirty="0"/>
+              <a:t>	body: </a:t>
+            </a:r>
+            <a:r>
+              <a:rPr lang="sk-SK" dirty="0" err="1"/>
+              <a:t>JSON.stringify</a:t>
+            </a:r>
+            <a:r>
+              <a:rPr lang="sk-SK" dirty="0"/>
+              <a:t>(</a:t>
+            </a:r>
+            <a:r>
+              <a:rPr lang="sk-SK" dirty="0" err="1"/>
+              <a:t>data</a:t>
+            </a:r>
+            <a:r>
+              <a:rPr lang="sk-SK" dirty="0"/>
+              <a:t>)</a:t>
+            </a:r>
+          </a:p>
+          <a:p>
+            <a:r>
+              <a:rPr lang="sk-SK" dirty="0"/>
+              <a:t>}).</a:t>
+            </a:r>
+            <a:r>
+              <a:rPr lang="sk-SK" dirty="0" err="1"/>
+              <a:t>then</a:t>
+            </a:r>
+            <a:r>
+              <a:rPr lang="sk-SK" dirty="0"/>
+              <a:t>(</a:t>
+            </a:r>
+            <a:r>
+              <a:rPr lang="sk-SK" dirty="0" err="1"/>
+              <a:t>res</a:t>
+            </a:r>
+            <a:r>
+              <a:rPr lang="sk-SK" dirty="0"/>
+              <a:t> =&gt; {</a:t>
+            </a:r>
+          </a:p>
+          <a:p>
+            <a:r>
+              <a:rPr lang="sk-SK" dirty="0"/>
+              <a:t>});</a:t>
+            </a:r>
+          </a:p>
+          <a:p>
+            <a:r>
+              <a:rPr lang="sk-SK" dirty="0"/>
+              <a:t>}</a:t>
+            </a:r>
+          </a:p>
+          <a:p>
+            <a:r>
+              <a:rPr lang="sk-SK" dirty="0" err="1"/>
+              <a:t>aa</a:t>
+            </a:r>
+            <a:r>
+              <a:rPr lang="sk-SK" dirty="0"/>
+              <a:t>();</a:t>
+            </a:r>
+          </a:p>
+        </p:txBody>
+      </p:sp>
+      <p:sp>
+        <p:nvSpPr>
+          <p:cNvPr id="4" name="Nadpis 1">
+            <a:extLst>
+              <a:ext uri="{FF2B5EF4-FFF2-40B4-BE49-F238E27FC236}">
+                <a16:creationId xmlns:a16="http://schemas.microsoft.com/office/drawing/2014/main" id="{13D2EA1A-7C11-4EA4-B02C-79EDE0AB0138}"/>
+              </a:ext>
+            </a:extLst>
+          </p:cNvPr>
+          <p:cNvSpPr txBox="1">
+            <a:spLocks/>
+          </p:cNvSpPr>
+          <p:nvPr/>
+        </p:nvSpPr>
+        <p:spPr>
+          <a:xfrm>
+            <a:off x="299559" y="113993"/>
+            <a:ext cx="11997952" cy="1320800"/>
+          </a:xfrm>
+          <a:prstGeom prst="rect">
+            <a:avLst/>
+          </a:prstGeom>
+        </p:spPr>
+        <p:txBody>
+          <a:bodyPr vert="horz" lIns="91440" tIns="45720" rIns="91440" bIns="45720" rtlCol="0" anchor="t">
+            <a:noAutofit/>
+          </a:bodyPr>
+          <a:lstStyle>
+            <a:lvl1pPr algn="l" defTabSz="457200" rtl="0" eaLnBrk="1" latinLnBrk="0" hangingPunct="1">
+              <a:spcBef>
+                <a:spcPct val="0"/>
+              </a:spcBef>
+              <a:buNone/>
+              <a:defRPr sz="3600" kern="1200">
+                <a:solidFill>
+                  <a:schemeClr val="accent1"/>
+                </a:solidFill>
+                <a:latin typeface="+mj-lt"/>
+                <a:ea typeface="+mj-ea"/>
+                <a:cs typeface="+mj-cs"/>
+              </a:defRPr>
+            </a:lvl1pPr>
+            <a:lvl2pPr eaLnBrk="1" hangingPunct="1">
+              <a:defRPr>
+                <a:solidFill>
+                  <a:schemeClr val="tx2"/>
+                </a:solidFill>
+              </a:defRPr>
+            </a:lvl2pPr>
+            <a:lvl3pPr eaLnBrk="1" hangingPunct="1">
+              <a:defRPr>
+                <a:solidFill>
+                  <a:schemeClr val="tx2"/>
+                </a:solidFill>
+              </a:defRPr>
+            </a:lvl3pPr>
+            <a:lvl4pPr eaLnBrk="1" hangingPunct="1">
+              <a:defRPr>
+                <a:solidFill>
+                  <a:schemeClr val="tx2"/>
+                </a:solidFill>
+              </a:defRPr>
+            </a:lvl4pPr>
+            <a:lvl5pPr eaLnBrk="1" hangingPunct="1">
+              <a:defRPr>
+                <a:solidFill>
+                  <a:schemeClr val="tx2"/>
+                </a:solidFill>
+              </a:defRPr>
+            </a:lvl5pPr>
+            <a:lvl6pPr eaLnBrk="1" hangingPunct="1">
+              <a:defRPr>
+                <a:solidFill>
+                  <a:schemeClr val="tx2"/>
+                </a:solidFill>
+              </a:defRPr>
+            </a:lvl6pPr>
+            <a:lvl7pPr eaLnBrk="1" hangingPunct="1">
+              <a:defRPr>
+                <a:solidFill>
+                  <a:schemeClr val="tx2"/>
+                </a:solidFill>
+              </a:defRPr>
+            </a:lvl7pPr>
+            <a:lvl8pPr eaLnBrk="1" hangingPunct="1">
+              <a:defRPr>
+                <a:solidFill>
+                  <a:schemeClr val="tx2"/>
+                </a:solidFill>
+              </a:defRPr>
+            </a:lvl8pPr>
+            <a:lvl9pPr eaLnBrk="1" hangingPunct="1">
+              <a:defRPr>
+                <a:solidFill>
+                  <a:schemeClr val="tx2"/>
+                </a:solidFill>
+              </a:defRPr>
+            </a:lvl9pPr>
+          </a:lstStyle>
+          <a:p>
+            <a:r>
+              <a:rPr lang="sk-SK" sz="4800" b="1" dirty="0"/>
+              <a:t>Skript vo webovom </a:t>
+            </a:r>
+          </a:p>
+          <a:p>
+            <a:r>
+              <a:rPr lang="sk-SK" sz="4800" b="1" dirty="0" err="1"/>
+              <a:t>honey</a:t>
+            </a:r>
+            <a:r>
+              <a:rPr lang="sk-SK" sz="4800" b="1" dirty="0"/>
+              <a:t> tokene</a:t>
+            </a:r>
+          </a:p>
+        </p:txBody>
+      </p:sp>
+      <p:sp>
+        <p:nvSpPr>
+          <p:cNvPr id="5" name="Šípka: nadol 4">
+            <a:extLst>
+              <a:ext uri="{FF2B5EF4-FFF2-40B4-BE49-F238E27FC236}">
+                <a16:creationId xmlns:a16="http://schemas.microsoft.com/office/drawing/2014/main" id="{4DAA942C-1F2D-4744-9888-84851500EB35}"/>
+              </a:ext>
+            </a:extLst>
+          </p:cNvPr>
+          <p:cNvSpPr/>
+          <p:nvPr/>
+        </p:nvSpPr>
+        <p:spPr>
+          <a:xfrm rot="21363196">
+            <a:off x="3494670" y="2455007"/>
+            <a:ext cx="701336" cy="461639"/>
+          </a:xfrm>
+          <a:prstGeom prst="downArrow">
+            <a:avLst/>
+          </a:prstGeom>
+        </p:spPr>
+        <p:style>
+          <a:lnRef idx="2">
+            <a:schemeClr val="accent4">
+              <a:shade val="50000"/>
+            </a:schemeClr>
+          </a:lnRef>
+          <a:fillRef idx="1">
+            <a:schemeClr val="accent4"/>
+          </a:fillRef>
+          <a:effectRef idx="0">
+            <a:schemeClr val="accent4"/>
+          </a:effectRef>
+          <a:fontRef idx="minor">
+            <a:schemeClr val="lt1"/>
+          </a:fontRef>
+        </p:style>
+        <p:txBody>
+          <a:bodyPr rtlCol="0" anchor="ctr"/>
+          <a:lstStyle/>
+          <a:p>
+            <a:pPr algn="ctr"/>
+            <a:endParaRPr lang="sk-SK"/>
+          </a:p>
+        </p:txBody>
+      </p:sp>
+      <p:sp>
+        <p:nvSpPr>
+          <p:cNvPr id="6" name="BlokTextu 5">
+            <a:extLst>
+              <a:ext uri="{FF2B5EF4-FFF2-40B4-BE49-F238E27FC236}">
+                <a16:creationId xmlns:a16="http://schemas.microsoft.com/office/drawing/2014/main" id="{F739C662-D7A6-4BA0-A857-F72FCC562AE0}"/>
+              </a:ext>
+            </a:extLst>
+          </p:cNvPr>
+          <p:cNvSpPr txBox="1"/>
+          <p:nvPr/>
+        </p:nvSpPr>
+        <p:spPr>
+          <a:xfrm>
+            <a:off x="2788920" y="1747512"/>
+            <a:ext cx="2310248" cy="646331"/>
+          </a:xfrm>
+          <a:prstGeom prst="rect">
+            <a:avLst/>
+          </a:prstGeom>
+          <a:noFill/>
+        </p:spPr>
+        <p:txBody>
+          <a:bodyPr wrap="none" rtlCol="0">
+            <a:spAutoFit/>
+          </a:bodyPr>
+          <a:lstStyle/>
+          <a:p>
+            <a:r>
+              <a:rPr lang="sk-SK" dirty="0"/>
+              <a:t>Nahradenie </a:t>
+            </a:r>
+          </a:p>
+          <a:p>
+            <a:r>
+              <a:rPr lang="sk-SK" dirty="0"/>
+              <a:t>maskovanou správou</a:t>
+            </a:r>
+          </a:p>
+        </p:txBody>
+      </p:sp>
+      <p:sp>
+        <p:nvSpPr>
+          <p:cNvPr id="7" name="BlokTextu 6">
+            <a:extLst>
+              <a:ext uri="{FF2B5EF4-FFF2-40B4-BE49-F238E27FC236}">
+                <a16:creationId xmlns:a16="http://schemas.microsoft.com/office/drawing/2014/main" id="{7CA3E0D1-F6F8-4A78-A146-B060FC0F42B1}"/>
+              </a:ext>
+            </a:extLst>
+          </p:cNvPr>
+          <p:cNvSpPr txBox="1"/>
+          <p:nvPr/>
+        </p:nvSpPr>
+        <p:spPr>
+          <a:xfrm>
+            <a:off x="5250673" y="1712824"/>
+            <a:ext cx="4796506" cy="646331"/>
+          </a:xfrm>
+          <a:prstGeom prst="rect">
+            <a:avLst/>
+          </a:prstGeom>
+          <a:noFill/>
+        </p:spPr>
+        <p:txBody>
+          <a:bodyPr wrap="none" rtlCol="0">
+            <a:spAutoFit/>
+          </a:bodyPr>
+          <a:lstStyle/>
+          <a:p>
+            <a:r>
+              <a:rPr lang="sk-SK" dirty="0"/>
+              <a:t>Na záver ešte prevedenou do base64, </a:t>
+            </a:r>
+          </a:p>
+          <a:p>
+            <a:r>
+              <a:rPr lang="sk-SK" dirty="0"/>
+              <a:t>aby ju bolo možné postupne spájať v skripte</a:t>
+            </a:r>
+          </a:p>
+        </p:txBody>
+      </p:sp>
+      <p:sp>
+        <p:nvSpPr>
+          <p:cNvPr id="8" name="BlokTextu 7">
+            <a:extLst>
+              <a:ext uri="{FF2B5EF4-FFF2-40B4-BE49-F238E27FC236}">
+                <a16:creationId xmlns:a16="http://schemas.microsoft.com/office/drawing/2014/main" id="{3C501764-1274-4CBC-9F49-F8FADAAB1636}"/>
+              </a:ext>
+            </a:extLst>
+          </p:cNvPr>
+          <p:cNvSpPr txBox="1"/>
+          <p:nvPr/>
+        </p:nvSpPr>
+        <p:spPr>
+          <a:xfrm>
+            <a:off x="5099168" y="1293967"/>
+            <a:ext cx="1199367" cy="461665"/>
+          </a:xfrm>
+          <a:prstGeom prst="rect">
+            <a:avLst/>
+          </a:prstGeom>
+          <a:noFill/>
+        </p:spPr>
+        <p:txBody>
+          <a:bodyPr wrap="none" rtlCol="0">
+            <a:spAutoFit/>
+          </a:bodyPr>
+          <a:lstStyle/>
+          <a:p>
+            <a:r>
+              <a:rPr lang="sk-SK" sz="2400" b="1" dirty="0"/>
+              <a:t>base64</a:t>
+            </a:r>
+          </a:p>
+        </p:txBody>
+      </p:sp>
+      <p:sp>
+        <p:nvSpPr>
+          <p:cNvPr id="9" name="BlokTextu 8">
+            <a:extLst>
+              <a:ext uri="{FF2B5EF4-FFF2-40B4-BE49-F238E27FC236}">
+                <a16:creationId xmlns:a16="http://schemas.microsoft.com/office/drawing/2014/main" id="{917F2A0B-F65A-43B2-925F-40C376B3C22D}"/>
+              </a:ext>
+            </a:extLst>
+          </p:cNvPr>
+          <p:cNvSpPr txBox="1"/>
+          <p:nvPr/>
+        </p:nvSpPr>
+        <p:spPr>
+          <a:xfrm>
+            <a:off x="6298535" y="2397557"/>
+            <a:ext cx="3299301" cy="646331"/>
+          </a:xfrm>
+          <a:prstGeom prst="rect">
+            <a:avLst/>
+          </a:prstGeom>
+          <a:noFill/>
+        </p:spPr>
+        <p:txBody>
+          <a:bodyPr wrap="none" rtlCol="0">
+            <a:spAutoFit/>
+          </a:bodyPr>
+          <a:lstStyle/>
+          <a:p>
+            <a:r>
+              <a:rPr lang="sk-SK" i="1" dirty="0"/>
+              <a:t>Inak by mohlo dôjsť ku</a:t>
+            </a:r>
+          </a:p>
+          <a:p>
+            <a:r>
+              <a:rPr lang="sk-SK" i="1" dirty="0"/>
+              <a:t> kolíziám s niektorými znakmi</a:t>
+            </a:r>
+          </a:p>
+        </p:txBody>
+      </p:sp>
+    </p:spTree>
+    <p:extLst>
+      <p:ext uri="{BB962C8B-B14F-4D97-AF65-F5344CB8AC3E}">
+        <p14:creationId xmlns:p14="http://schemas.microsoft.com/office/powerpoint/2010/main" val="106275954"/>
+      </p:ext>
+    </p:extLst>
+  </p:cSld>
+  <p:clrMapOvr>
+    <a:masterClrMapping/>
+  </p:clrMapOvr>
+</p:sld>
+</file>
+
+<file path=ppt/slides/slide14.xml><?xml version="1.0" encoding="utf-8"?>
+<p:sld xmlns:a="http://schemas.openxmlformats.org/drawingml/2006/main" xmlns:r="http://schemas.openxmlformats.org/officeDocument/2006/relationships" xmlns:p="http://schemas.openxmlformats.org/presentationml/2006/main">
+  <p:cSld>
+    <p:spTree>
+      <p:nvGrpSpPr>
+        <p:cNvPr id="1" name=""/>
+        <p:cNvGrpSpPr/>
+        <p:nvPr/>
+      </p:nvGrpSpPr>
+      <p:grpSpPr>
+        <a:xfrm>
+          <a:off x="0" y="0"/>
+          <a:ext cx="0" cy="0"/>
+          <a:chOff x="0" y="0"/>
+          <a:chExt cx="0" cy="0"/>
+        </a:xfrm>
+      </p:grpSpPr>
+      <p:sp>
+        <p:nvSpPr>
+          <p:cNvPr id="2" name="Nadpis 1">
+            <a:extLst>
+              <a:ext uri="{FF2B5EF4-FFF2-40B4-BE49-F238E27FC236}">
+                <a16:creationId xmlns:a16="http://schemas.microsoft.com/office/drawing/2014/main" id="{9C2E4166-391E-4894-A1E8-E40E94C2680D}"/>
+              </a:ext>
+            </a:extLst>
+          </p:cNvPr>
+          <p:cNvSpPr>
+            <a:spLocks noGrp="1"/>
+          </p:cNvSpPr>
+          <p:nvPr>
+            <p:ph type="title"/>
+          </p:nvPr>
+        </p:nvSpPr>
+        <p:spPr>
+          <a:xfrm>
+            <a:off x="5650708" y="150814"/>
+            <a:ext cx="8596668" cy="1320800"/>
+          </a:xfrm>
+        </p:spPr>
+        <p:txBody>
+          <a:bodyPr>
+            <a:noAutofit/>
+          </a:bodyPr>
+          <a:lstStyle/>
+          <a:p>
+            <a:r>
+              <a:rPr lang="sk-SK" sz="4800" b="1" dirty="0"/>
+              <a:t>Spracovanie </a:t>
+            </a:r>
+            <a:br>
+              <a:rPr lang="sk-SK" sz="4800" b="1" dirty="0"/>
+            </a:br>
+            <a:r>
+              <a:rPr lang="sk-SK" sz="4800" b="1" dirty="0"/>
+              <a:t>			dopytu</a:t>
+            </a:r>
+          </a:p>
+        </p:txBody>
+      </p:sp>
+      <p:sp>
+        <p:nvSpPr>
+          <p:cNvPr id="3" name="Zástupný objekt pre obsah 2">
+            <a:extLst>
+              <a:ext uri="{FF2B5EF4-FFF2-40B4-BE49-F238E27FC236}">
+                <a16:creationId xmlns:a16="http://schemas.microsoft.com/office/drawing/2014/main" id="{F6280BE9-D282-40E2-BF20-B70B6BAC619B}"/>
+              </a:ext>
+            </a:extLst>
+          </p:cNvPr>
+          <p:cNvSpPr>
+            <a:spLocks noGrp="1"/>
+          </p:cNvSpPr>
+          <p:nvPr>
+            <p:ph idx="1"/>
+          </p:nvPr>
+        </p:nvSpPr>
+        <p:spPr>
+          <a:xfrm>
+            <a:off x="259285" y="551214"/>
+            <a:ext cx="7174787" cy="6478480"/>
+          </a:xfrm>
+        </p:spPr>
+        <p:txBody>
+          <a:bodyPr>
+            <a:normAutofit fontScale="85000" lnSpcReduction="20000"/>
+          </a:bodyPr>
+          <a:lstStyle/>
+          <a:p>
+            <a:r>
+              <a:rPr lang="sk-SK" dirty="0" err="1"/>
+              <a:t>const</a:t>
+            </a:r>
+            <a:r>
+              <a:rPr lang="sk-SK" dirty="0"/>
+              <a:t> </a:t>
+            </a:r>
+            <a:r>
+              <a:rPr lang="sk-SK" dirty="0" err="1"/>
+              <a:t>PythonShell</a:t>
+            </a:r>
+            <a:r>
+              <a:rPr lang="sk-SK" dirty="0"/>
+              <a:t> = </a:t>
+            </a:r>
+            <a:r>
+              <a:rPr lang="sk-SK" dirty="0" err="1"/>
+              <a:t>require</a:t>
+            </a:r>
+            <a:r>
+              <a:rPr lang="sk-SK" dirty="0"/>
+              <a:t>('</a:t>
+            </a:r>
+            <a:r>
+              <a:rPr lang="sk-SK" dirty="0" err="1"/>
+              <a:t>python-shell</a:t>
+            </a:r>
+            <a:r>
+              <a:rPr lang="sk-SK" dirty="0"/>
+              <a:t>').</a:t>
+            </a:r>
+            <a:r>
+              <a:rPr lang="sk-SK" dirty="0" err="1"/>
+              <a:t>PythonShell</a:t>
+            </a:r>
+            <a:r>
+              <a:rPr lang="sk-SK" dirty="0"/>
+              <a:t>;</a:t>
+            </a:r>
+          </a:p>
+          <a:p>
+            <a:r>
+              <a:rPr lang="sk-SK" dirty="0" err="1"/>
+              <a:t>router.post</a:t>
+            </a:r>
+            <a:r>
+              <a:rPr lang="sk-SK" dirty="0"/>
+              <a:t>('/</a:t>
+            </a:r>
+            <a:r>
+              <a:rPr lang="sk-SK" dirty="0" err="1"/>
+              <a:t>replaceMe</a:t>
+            </a:r>
+            <a:r>
+              <a:rPr lang="sk-SK" dirty="0"/>
+              <a:t>', </a:t>
+            </a:r>
+            <a:r>
+              <a:rPr lang="sk-SK" dirty="0" err="1"/>
+              <a:t>function</a:t>
+            </a:r>
+            <a:r>
+              <a:rPr lang="sk-SK" dirty="0"/>
+              <a:t>(</a:t>
+            </a:r>
+            <a:r>
+              <a:rPr lang="sk-SK" dirty="0" err="1"/>
+              <a:t>req</a:t>
+            </a:r>
+            <a:r>
+              <a:rPr lang="sk-SK" dirty="0"/>
+              <a:t>, </a:t>
+            </a:r>
+            <a:r>
+              <a:rPr lang="sk-SK" dirty="0" err="1"/>
+              <a:t>res</a:t>
+            </a:r>
+            <a:r>
+              <a:rPr lang="sk-SK" dirty="0"/>
+              <a:t>){</a:t>
+            </a:r>
+          </a:p>
+          <a:p>
+            <a:r>
+              <a:rPr lang="sk-SK" dirty="0"/>
+              <a:t>   	var </a:t>
+            </a:r>
+            <a:r>
+              <a:rPr lang="sk-SK" dirty="0" err="1"/>
+              <a:t>concealedData</a:t>
+            </a:r>
+            <a:r>
+              <a:rPr lang="sk-SK" dirty="0"/>
+              <a:t> = </a:t>
+            </a:r>
+            <a:r>
+              <a:rPr lang="sk-SK" dirty="0" err="1"/>
+              <a:t>req.body.element</a:t>
+            </a:r>
+            <a:r>
+              <a:rPr lang="sk-SK" dirty="0"/>
+              <a:t>;</a:t>
+            </a:r>
+          </a:p>
+          <a:p>
+            <a:r>
+              <a:rPr lang="sk-SK" dirty="0"/>
+              <a:t>	let </a:t>
+            </a:r>
+            <a:r>
+              <a:rPr lang="sk-SK" dirty="0" err="1"/>
+              <a:t>buff</a:t>
+            </a:r>
+            <a:r>
+              <a:rPr lang="sk-SK" dirty="0"/>
+              <a:t> = </a:t>
+            </a:r>
+            <a:r>
+              <a:rPr lang="sk-SK" dirty="0" err="1"/>
+              <a:t>Buffer.from</a:t>
+            </a:r>
+            <a:r>
+              <a:rPr lang="sk-SK" dirty="0"/>
+              <a:t>(</a:t>
+            </a:r>
+            <a:r>
+              <a:rPr lang="sk-SK" dirty="0" err="1"/>
+              <a:t>concealedData</a:t>
+            </a:r>
+            <a:r>
+              <a:rPr lang="sk-SK" dirty="0"/>
+              <a:t>, 'base64');</a:t>
+            </a:r>
+          </a:p>
+          <a:p>
+            <a:r>
+              <a:rPr lang="sk-SK" dirty="0"/>
+              <a:t>	</a:t>
+            </a:r>
+            <a:r>
+              <a:rPr lang="sk-SK" dirty="0" err="1"/>
+              <a:t>concealedData</a:t>
+            </a:r>
+            <a:r>
+              <a:rPr lang="sk-SK" dirty="0"/>
+              <a:t> = </a:t>
+            </a:r>
+            <a:r>
+              <a:rPr lang="sk-SK" dirty="0" err="1"/>
+              <a:t>buff.toString</a:t>
+            </a:r>
+            <a:r>
+              <a:rPr lang="sk-SK" dirty="0"/>
+              <a:t>('</a:t>
+            </a:r>
+            <a:r>
+              <a:rPr lang="sk-SK" dirty="0" err="1"/>
+              <a:t>ascii</a:t>
+            </a:r>
+            <a:r>
+              <a:rPr lang="sk-SK" dirty="0"/>
+              <a:t>');</a:t>
+            </a:r>
+          </a:p>
+          <a:p>
+            <a:r>
+              <a:rPr lang="sk-SK" dirty="0"/>
+              <a:t>	let </a:t>
+            </a:r>
+            <a:r>
+              <a:rPr lang="sk-SK" dirty="0" err="1"/>
+              <a:t>options</a:t>
+            </a:r>
+            <a:r>
+              <a:rPr lang="sk-SK" dirty="0"/>
+              <a:t> = {</a:t>
+            </a:r>
+          </a:p>
+          <a:p>
+            <a:r>
+              <a:rPr lang="sk-SK" dirty="0"/>
+              <a:t> 		</a:t>
+            </a:r>
+            <a:r>
+              <a:rPr lang="sk-SK" dirty="0" err="1"/>
+              <a:t>mode</a:t>
+            </a:r>
+            <a:r>
+              <a:rPr lang="sk-SK" dirty="0"/>
+              <a:t>: 'text',</a:t>
+            </a:r>
+          </a:p>
+          <a:p>
+            <a:r>
+              <a:rPr lang="sk-SK" dirty="0"/>
+              <a:t>  		</a:t>
+            </a:r>
+            <a:r>
+              <a:rPr lang="sk-SK" dirty="0" err="1"/>
+              <a:t>pythonOptions</a:t>
+            </a:r>
+            <a:r>
+              <a:rPr lang="sk-SK" dirty="0"/>
+              <a:t>: ['-u'], // get </a:t>
+            </a:r>
+            <a:r>
+              <a:rPr lang="sk-SK" dirty="0" err="1"/>
+              <a:t>print</a:t>
+            </a:r>
+            <a:r>
+              <a:rPr lang="sk-SK" dirty="0"/>
+              <a:t> </a:t>
+            </a:r>
+            <a:r>
+              <a:rPr lang="sk-SK" dirty="0" err="1"/>
+              <a:t>results</a:t>
+            </a:r>
+            <a:r>
+              <a:rPr lang="sk-SK" dirty="0"/>
+              <a:t> in </a:t>
+            </a:r>
+            <a:r>
+              <a:rPr lang="sk-SK" dirty="0" err="1"/>
+              <a:t>real-time</a:t>
+            </a:r>
+            <a:endParaRPr lang="sk-SK" dirty="0"/>
+          </a:p>
+          <a:p>
+            <a:r>
+              <a:rPr lang="sk-SK" dirty="0"/>
+              <a:t>  		</a:t>
+            </a:r>
+            <a:r>
+              <a:rPr lang="sk-SK" dirty="0" err="1"/>
+              <a:t>args</a:t>
+            </a:r>
+            <a:r>
+              <a:rPr lang="sk-SK" dirty="0"/>
+              <a:t>: ['-</a:t>
+            </a:r>
+            <a:r>
+              <a:rPr lang="sk-SK" dirty="0" err="1"/>
+              <a:t>unconcealing</a:t>
+            </a:r>
+            <a:r>
+              <a:rPr lang="sk-SK" dirty="0"/>
+              <a:t>', '-</a:t>
+            </a:r>
+            <a:r>
+              <a:rPr lang="sk-SK" dirty="0" err="1"/>
+              <a:t>key</a:t>
+            </a:r>
+            <a:r>
+              <a:rPr lang="sk-SK" dirty="0"/>
+              <a:t>', '&lt;&lt;[</a:t>
+            </a:r>
+            <a:r>
+              <a:rPr lang="sk-SK" dirty="0" err="1"/>
+              <a:t>key</a:t>
+            </a:r>
+            <a:r>
+              <a:rPr lang="sk-SK" dirty="0"/>
+              <a:t>]&gt;&gt;']</a:t>
+            </a:r>
+          </a:p>
+          <a:p>
+            <a:r>
+              <a:rPr lang="sk-SK" dirty="0"/>
+              <a:t>	};</a:t>
+            </a:r>
+          </a:p>
+          <a:p>
+            <a:r>
+              <a:rPr lang="sk-SK" dirty="0"/>
+              <a:t>	var </a:t>
+            </a:r>
+            <a:r>
+              <a:rPr lang="sk-SK" dirty="0" err="1"/>
+              <a:t>pythonShell</a:t>
+            </a:r>
+            <a:r>
+              <a:rPr lang="sk-SK" dirty="0"/>
+              <a:t> = new </a:t>
+            </a:r>
+            <a:r>
+              <a:rPr lang="sk-SK" dirty="0" err="1"/>
+              <a:t>PythonShell</a:t>
+            </a:r>
+            <a:r>
+              <a:rPr lang="sk-SK" dirty="0"/>
+              <a:t>('content_concealing_script.py', </a:t>
+            </a:r>
+            <a:r>
+              <a:rPr lang="sk-SK" dirty="0" err="1"/>
+              <a:t>options</a:t>
+            </a:r>
+            <a:r>
+              <a:rPr lang="sk-SK" dirty="0"/>
+              <a:t>);</a:t>
+            </a:r>
+          </a:p>
+          <a:p>
+            <a:r>
+              <a:rPr lang="sk-SK" dirty="0"/>
+              <a:t>	</a:t>
+            </a:r>
+            <a:r>
+              <a:rPr lang="sk-SK" dirty="0" err="1"/>
+              <a:t>pythonShell.send</a:t>
+            </a:r>
+            <a:r>
+              <a:rPr lang="sk-SK" dirty="0"/>
+              <a:t>(</a:t>
+            </a:r>
+            <a:r>
+              <a:rPr lang="sk-SK" dirty="0" err="1"/>
+              <a:t>concealedData</a:t>
+            </a:r>
+            <a:r>
+              <a:rPr lang="sk-SK" dirty="0"/>
+              <a:t>);</a:t>
+            </a:r>
+          </a:p>
+          <a:p>
+            <a:r>
+              <a:rPr lang="sk-SK" dirty="0"/>
+              <a:t>	</a:t>
+            </a:r>
+            <a:r>
+              <a:rPr lang="sk-SK" dirty="0" err="1"/>
+              <a:t>pythonShell.on</a:t>
+            </a:r>
+            <a:r>
+              <a:rPr lang="sk-SK" dirty="0"/>
+              <a:t>('</a:t>
+            </a:r>
+            <a:r>
+              <a:rPr lang="sk-SK" dirty="0" err="1"/>
+              <a:t>message</a:t>
+            </a:r>
+            <a:r>
+              <a:rPr lang="sk-SK" dirty="0"/>
+              <a:t>', </a:t>
+            </a:r>
+            <a:r>
+              <a:rPr lang="sk-SK" dirty="0" err="1"/>
+              <a:t>function</a:t>
+            </a:r>
+            <a:r>
+              <a:rPr lang="sk-SK" dirty="0"/>
+              <a:t> (</a:t>
+            </a:r>
+            <a:r>
+              <a:rPr lang="sk-SK" dirty="0" err="1"/>
+              <a:t>message</a:t>
+            </a:r>
+            <a:r>
+              <a:rPr lang="sk-SK" dirty="0"/>
+              <a:t>) {</a:t>
+            </a:r>
+          </a:p>
+          <a:p>
+            <a:r>
+              <a:rPr lang="sk-SK" dirty="0"/>
+              <a:t>  		console.log("FINAL LOG:");</a:t>
+            </a:r>
+          </a:p>
+          <a:p>
+            <a:r>
+              <a:rPr lang="sk-SK" dirty="0"/>
+              <a:t>  		console.log(</a:t>
+            </a:r>
+            <a:r>
+              <a:rPr lang="sk-SK" dirty="0" err="1"/>
+              <a:t>message</a:t>
+            </a:r>
+            <a:r>
+              <a:rPr lang="sk-SK" dirty="0"/>
+              <a:t>);</a:t>
+            </a:r>
+          </a:p>
+          <a:p>
+            <a:r>
+              <a:rPr lang="sk-SK" dirty="0"/>
+              <a:t>	});</a:t>
+            </a:r>
+          </a:p>
+          <a:p>
+            <a:r>
+              <a:rPr lang="sk-SK" dirty="0"/>
+              <a:t>	</a:t>
+            </a:r>
+            <a:r>
+              <a:rPr lang="sk-SK" dirty="0" err="1"/>
+              <a:t>pythonShell.end</a:t>
+            </a:r>
+            <a:r>
+              <a:rPr lang="sk-SK" dirty="0"/>
+              <a:t>(</a:t>
+            </a:r>
+            <a:r>
+              <a:rPr lang="sk-SK" dirty="0" err="1"/>
+              <a:t>function</a:t>
+            </a:r>
+            <a:r>
+              <a:rPr lang="sk-SK" dirty="0"/>
+              <a:t> (</a:t>
+            </a:r>
+            <a:r>
+              <a:rPr lang="sk-SK" dirty="0" err="1"/>
+              <a:t>err,code,signal</a:t>
+            </a:r>
+            <a:r>
+              <a:rPr lang="sk-SK" dirty="0"/>
+              <a:t>) {</a:t>
+            </a:r>
+          </a:p>
+          <a:p>
+            <a:r>
+              <a:rPr lang="sk-SK" dirty="0"/>
+              <a:t>  		</a:t>
+            </a:r>
+            <a:r>
+              <a:rPr lang="sk-SK" dirty="0" err="1"/>
+              <a:t>if</a:t>
+            </a:r>
+            <a:r>
+              <a:rPr lang="sk-SK" dirty="0"/>
+              <a:t> (</a:t>
+            </a:r>
+            <a:r>
+              <a:rPr lang="sk-SK" dirty="0" err="1"/>
+              <a:t>err</a:t>
+            </a:r>
+            <a:r>
+              <a:rPr lang="sk-SK" dirty="0"/>
+              <a:t>) console.log(</a:t>
+            </a:r>
+            <a:r>
+              <a:rPr lang="sk-SK" dirty="0" err="1"/>
+              <a:t>err</a:t>
+            </a:r>
+            <a:r>
+              <a:rPr lang="sk-SK" dirty="0"/>
+              <a:t>);</a:t>
+            </a:r>
+          </a:p>
+          <a:p>
+            <a:r>
+              <a:rPr lang="sk-SK" dirty="0"/>
+              <a:t>	});</a:t>
+            </a:r>
+          </a:p>
+          <a:p>
+            <a:r>
+              <a:rPr lang="sk-SK" dirty="0"/>
+              <a:t>});</a:t>
+            </a:r>
+          </a:p>
+        </p:txBody>
+      </p:sp>
+      <p:sp>
+        <p:nvSpPr>
+          <p:cNvPr id="4" name="Šípka: nadol 3">
+            <a:extLst>
+              <a:ext uri="{FF2B5EF4-FFF2-40B4-BE49-F238E27FC236}">
+                <a16:creationId xmlns:a16="http://schemas.microsoft.com/office/drawing/2014/main" id="{2587B1E5-3BA9-4F62-BB00-853705189B55}"/>
+              </a:ext>
+            </a:extLst>
+          </p:cNvPr>
+          <p:cNvSpPr/>
+          <p:nvPr/>
+        </p:nvSpPr>
+        <p:spPr>
+          <a:xfrm rot="8466629">
+            <a:off x="4801488" y="1656430"/>
+            <a:ext cx="701336" cy="461639"/>
+          </a:xfrm>
+          <a:prstGeom prst="downArrow">
+            <a:avLst/>
+          </a:prstGeom>
+        </p:spPr>
+        <p:style>
+          <a:lnRef idx="2">
+            <a:schemeClr val="accent4">
+              <a:shade val="50000"/>
+            </a:schemeClr>
+          </a:lnRef>
+          <a:fillRef idx="1">
+            <a:schemeClr val="accent4"/>
+          </a:fillRef>
+          <a:effectRef idx="0">
+            <a:schemeClr val="accent4"/>
+          </a:effectRef>
+          <a:fontRef idx="minor">
+            <a:schemeClr val="lt1"/>
+          </a:fontRef>
+        </p:style>
+        <p:txBody>
+          <a:bodyPr rtlCol="0" anchor="ctr"/>
+          <a:lstStyle/>
+          <a:p>
+            <a:pPr algn="ctr"/>
+            <a:endParaRPr lang="sk-SK"/>
+          </a:p>
+        </p:txBody>
+      </p:sp>
+      <p:sp>
+        <p:nvSpPr>
+          <p:cNvPr id="5" name="BlokTextu 4">
+            <a:extLst>
+              <a:ext uri="{FF2B5EF4-FFF2-40B4-BE49-F238E27FC236}">
+                <a16:creationId xmlns:a16="http://schemas.microsoft.com/office/drawing/2014/main" id="{58F60173-968A-4D03-B2C4-26BD17F3D455}"/>
+              </a:ext>
+            </a:extLst>
+          </p:cNvPr>
+          <p:cNvSpPr txBox="1"/>
+          <p:nvPr/>
+        </p:nvSpPr>
+        <p:spPr>
+          <a:xfrm>
+            <a:off x="5570015" y="1872014"/>
+            <a:ext cx="4182555" cy="646331"/>
+          </a:xfrm>
+          <a:prstGeom prst="rect">
+            <a:avLst/>
+          </a:prstGeom>
+          <a:noFill/>
+        </p:spPr>
+        <p:txBody>
+          <a:bodyPr wrap="none" rtlCol="0">
+            <a:spAutoFit/>
+          </a:bodyPr>
+          <a:lstStyle/>
+          <a:p>
+            <a:r>
+              <a:rPr lang="sk-SK" dirty="0"/>
+              <a:t>Reťazec by mal byť v base64 aby </a:t>
+            </a:r>
+          </a:p>
+          <a:p>
+            <a:r>
+              <a:rPr lang="sk-SK" dirty="0"/>
+              <a:t>mohol byť použitý a skladaný v skripte</a:t>
+            </a:r>
+          </a:p>
+        </p:txBody>
+      </p:sp>
+      <p:sp>
+        <p:nvSpPr>
+          <p:cNvPr id="6" name="Šípka: nadol 5">
+            <a:extLst>
+              <a:ext uri="{FF2B5EF4-FFF2-40B4-BE49-F238E27FC236}">
+                <a16:creationId xmlns:a16="http://schemas.microsoft.com/office/drawing/2014/main" id="{6DB135B1-0842-4FBA-91A6-E67DBC25E413}"/>
+              </a:ext>
+            </a:extLst>
+          </p:cNvPr>
+          <p:cNvSpPr/>
+          <p:nvPr/>
+        </p:nvSpPr>
+        <p:spPr>
+          <a:xfrm rot="6041165">
+            <a:off x="5300040" y="2992465"/>
+            <a:ext cx="701336" cy="461639"/>
+          </a:xfrm>
+          <a:prstGeom prst="downArrow">
+            <a:avLst/>
+          </a:prstGeom>
+        </p:spPr>
+        <p:style>
+          <a:lnRef idx="2">
+            <a:schemeClr val="accent4">
+              <a:shade val="50000"/>
+            </a:schemeClr>
+          </a:lnRef>
+          <a:fillRef idx="1">
+            <a:schemeClr val="accent4"/>
+          </a:fillRef>
+          <a:effectRef idx="0">
+            <a:schemeClr val="accent4"/>
+          </a:effectRef>
+          <a:fontRef idx="minor">
+            <a:schemeClr val="lt1"/>
+          </a:fontRef>
+        </p:style>
+        <p:txBody>
+          <a:bodyPr rtlCol="0" anchor="ctr"/>
+          <a:lstStyle/>
+          <a:p>
+            <a:pPr algn="ctr"/>
+            <a:endParaRPr lang="sk-SK"/>
+          </a:p>
+        </p:txBody>
+      </p:sp>
+      <p:sp>
+        <p:nvSpPr>
+          <p:cNvPr id="7" name="BlokTextu 6">
+            <a:extLst>
+              <a:ext uri="{FF2B5EF4-FFF2-40B4-BE49-F238E27FC236}">
+                <a16:creationId xmlns:a16="http://schemas.microsoft.com/office/drawing/2014/main" id="{B196AF4A-C6F5-4FFE-A0ED-45C44A57C973}"/>
+              </a:ext>
+            </a:extLst>
+          </p:cNvPr>
+          <p:cNvSpPr txBox="1"/>
+          <p:nvPr/>
+        </p:nvSpPr>
+        <p:spPr>
+          <a:xfrm>
+            <a:off x="5942549" y="2964341"/>
+            <a:ext cx="4544834" cy="646331"/>
+          </a:xfrm>
+          <a:prstGeom prst="rect">
+            <a:avLst/>
+          </a:prstGeom>
+          <a:noFill/>
+        </p:spPr>
+        <p:txBody>
+          <a:bodyPr wrap="none" rtlCol="0">
+            <a:spAutoFit/>
+          </a:bodyPr>
+          <a:lstStyle/>
+          <a:p>
+            <a:r>
+              <a:rPr lang="sk-SK" dirty="0" err="1"/>
+              <a:t>Pythonovský</a:t>
+            </a:r>
+            <a:r>
+              <a:rPr lang="sk-SK" dirty="0"/>
+              <a:t> skript na odmaskovanie, kde </a:t>
+            </a:r>
+          </a:p>
+          <a:p>
+            <a:r>
+              <a:rPr lang="en-US" dirty="0"/>
+              <a:t>&lt;&lt;[key]&gt;&gt; </a:t>
+            </a:r>
+            <a:r>
+              <a:rPr lang="en-US" dirty="0" err="1"/>
+              <a:t>sa</a:t>
+            </a:r>
+            <a:r>
+              <a:rPr lang="en-US" dirty="0"/>
+              <a:t> </a:t>
+            </a:r>
+            <a:r>
+              <a:rPr lang="en-US" dirty="0" err="1"/>
+              <a:t>nahrad</a:t>
+            </a:r>
+            <a:r>
+              <a:rPr lang="sk-SK" dirty="0"/>
+              <a:t>í za kľúč</a:t>
+            </a:r>
+          </a:p>
+        </p:txBody>
+      </p:sp>
+      <p:sp>
+        <p:nvSpPr>
+          <p:cNvPr id="8" name="Šípka: nadol 7">
+            <a:extLst>
+              <a:ext uri="{FF2B5EF4-FFF2-40B4-BE49-F238E27FC236}">
+                <a16:creationId xmlns:a16="http://schemas.microsoft.com/office/drawing/2014/main" id="{226B5D65-B0BE-4D16-B959-2FEC65F368D8}"/>
+              </a:ext>
+            </a:extLst>
+          </p:cNvPr>
+          <p:cNvSpPr/>
+          <p:nvPr/>
+        </p:nvSpPr>
+        <p:spPr>
+          <a:xfrm rot="6041165">
+            <a:off x="7375245" y="3608325"/>
+            <a:ext cx="701336" cy="461639"/>
+          </a:xfrm>
+          <a:prstGeom prst="downArrow">
+            <a:avLst/>
+          </a:prstGeom>
+        </p:spPr>
+        <p:style>
+          <a:lnRef idx="2">
+            <a:schemeClr val="accent4">
+              <a:shade val="50000"/>
+            </a:schemeClr>
+          </a:lnRef>
+          <a:fillRef idx="1">
+            <a:schemeClr val="accent4"/>
+          </a:fillRef>
+          <a:effectRef idx="0">
+            <a:schemeClr val="accent4"/>
+          </a:effectRef>
+          <a:fontRef idx="minor">
+            <a:schemeClr val="lt1"/>
+          </a:fontRef>
+        </p:style>
+        <p:txBody>
+          <a:bodyPr rtlCol="0" anchor="ctr"/>
+          <a:lstStyle/>
+          <a:p>
+            <a:pPr algn="ctr"/>
+            <a:endParaRPr lang="sk-SK"/>
+          </a:p>
+        </p:txBody>
+      </p:sp>
+      <p:sp>
+        <p:nvSpPr>
+          <p:cNvPr id="9" name="BlokTextu 8">
+            <a:extLst>
+              <a:ext uri="{FF2B5EF4-FFF2-40B4-BE49-F238E27FC236}">
+                <a16:creationId xmlns:a16="http://schemas.microsoft.com/office/drawing/2014/main" id="{53CD9164-B15B-4F65-876D-D87833218342}"/>
+              </a:ext>
+            </a:extLst>
+          </p:cNvPr>
+          <p:cNvSpPr txBox="1"/>
+          <p:nvPr/>
+        </p:nvSpPr>
+        <p:spPr>
+          <a:xfrm>
+            <a:off x="8017753" y="3625227"/>
+            <a:ext cx="3111749" cy="646331"/>
+          </a:xfrm>
+          <a:prstGeom prst="rect">
+            <a:avLst/>
+          </a:prstGeom>
+          <a:noFill/>
+        </p:spPr>
+        <p:txBody>
+          <a:bodyPr wrap="none" rtlCol="0">
+            <a:spAutoFit/>
+          </a:bodyPr>
+          <a:lstStyle/>
+          <a:p>
+            <a:r>
+              <a:rPr lang="sk-SK" dirty="0"/>
+              <a:t>Funkcionalita vykonávajúca </a:t>
+            </a:r>
+          </a:p>
+          <a:p>
+            <a:r>
+              <a:rPr lang="sk-SK" dirty="0" err="1"/>
+              <a:t>pythonovský</a:t>
+            </a:r>
+            <a:r>
+              <a:rPr lang="sk-SK" dirty="0"/>
+              <a:t> kód v </a:t>
+            </a:r>
+            <a:r>
+              <a:rPr lang="sk-SK" dirty="0" err="1"/>
+              <a:t>NodeJS</a:t>
+            </a:r>
+            <a:endParaRPr lang="sk-SK" dirty="0"/>
+          </a:p>
+        </p:txBody>
+      </p:sp>
+      <p:sp>
+        <p:nvSpPr>
+          <p:cNvPr id="10" name="Šípka: nadol 9">
+            <a:extLst>
+              <a:ext uri="{FF2B5EF4-FFF2-40B4-BE49-F238E27FC236}">
+                <a16:creationId xmlns:a16="http://schemas.microsoft.com/office/drawing/2014/main" id="{D2751466-F166-49BF-B901-BD439A04DB1B}"/>
+              </a:ext>
+            </a:extLst>
+          </p:cNvPr>
+          <p:cNvSpPr/>
+          <p:nvPr/>
+        </p:nvSpPr>
+        <p:spPr>
+          <a:xfrm rot="6041165">
+            <a:off x="3737936" y="3874444"/>
+            <a:ext cx="701336" cy="461639"/>
+          </a:xfrm>
+          <a:prstGeom prst="downArrow">
+            <a:avLst/>
+          </a:prstGeom>
+        </p:spPr>
+        <p:style>
+          <a:lnRef idx="2">
+            <a:schemeClr val="accent4">
+              <a:shade val="50000"/>
+            </a:schemeClr>
+          </a:lnRef>
+          <a:fillRef idx="1">
+            <a:schemeClr val="accent4"/>
+          </a:fillRef>
+          <a:effectRef idx="0">
+            <a:schemeClr val="accent4"/>
+          </a:effectRef>
+          <a:fontRef idx="minor">
+            <a:schemeClr val="lt1"/>
+          </a:fontRef>
+        </p:style>
+        <p:txBody>
+          <a:bodyPr rtlCol="0" anchor="ctr"/>
+          <a:lstStyle/>
+          <a:p>
+            <a:pPr algn="ctr"/>
+            <a:endParaRPr lang="sk-SK"/>
+          </a:p>
+        </p:txBody>
+      </p:sp>
+      <p:sp>
+        <p:nvSpPr>
+          <p:cNvPr id="11" name="BlokTextu 10">
+            <a:extLst>
+              <a:ext uri="{FF2B5EF4-FFF2-40B4-BE49-F238E27FC236}">
+                <a16:creationId xmlns:a16="http://schemas.microsoft.com/office/drawing/2014/main" id="{25040622-BC94-4628-8441-D5D49A1FE386}"/>
+              </a:ext>
+            </a:extLst>
+          </p:cNvPr>
+          <p:cNvSpPr txBox="1"/>
+          <p:nvPr/>
+        </p:nvSpPr>
+        <p:spPr>
+          <a:xfrm>
+            <a:off x="4351707" y="3996794"/>
+            <a:ext cx="3267241" cy="369332"/>
+          </a:xfrm>
+          <a:prstGeom prst="rect">
+            <a:avLst/>
+          </a:prstGeom>
+          <a:noFill/>
+        </p:spPr>
+        <p:txBody>
+          <a:bodyPr wrap="none" rtlCol="0">
+            <a:spAutoFit/>
+          </a:bodyPr>
+          <a:lstStyle/>
+          <a:p>
+            <a:r>
+              <a:rPr lang="sk-SK" dirty="0"/>
+              <a:t>Odoslanie zamaskovaných dát</a:t>
+            </a:r>
+          </a:p>
+        </p:txBody>
+      </p:sp>
+      <p:sp>
+        <p:nvSpPr>
+          <p:cNvPr id="12" name="Šípka: nadol 11">
+            <a:extLst>
+              <a:ext uri="{FF2B5EF4-FFF2-40B4-BE49-F238E27FC236}">
+                <a16:creationId xmlns:a16="http://schemas.microsoft.com/office/drawing/2014/main" id="{8BE4931F-0579-442B-AF95-83291C3DE3C9}"/>
+              </a:ext>
+            </a:extLst>
+          </p:cNvPr>
+          <p:cNvSpPr/>
+          <p:nvPr/>
+        </p:nvSpPr>
+        <p:spPr>
+          <a:xfrm rot="6041165">
+            <a:off x="3664715" y="4840660"/>
+            <a:ext cx="701336" cy="461639"/>
+          </a:xfrm>
+          <a:prstGeom prst="downArrow">
+            <a:avLst/>
+          </a:prstGeom>
+        </p:spPr>
+        <p:style>
+          <a:lnRef idx="2">
+            <a:schemeClr val="accent4">
+              <a:shade val="50000"/>
+            </a:schemeClr>
+          </a:lnRef>
+          <a:fillRef idx="1">
+            <a:schemeClr val="accent4"/>
+          </a:fillRef>
+          <a:effectRef idx="0">
+            <a:schemeClr val="accent4"/>
+          </a:effectRef>
+          <a:fontRef idx="minor">
+            <a:schemeClr val="lt1"/>
+          </a:fontRef>
+        </p:style>
+        <p:txBody>
+          <a:bodyPr rtlCol="0" anchor="ctr"/>
+          <a:lstStyle/>
+          <a:p>
+            <a:pPr algn="ctr"/>
+            <a:endParaRPr lang="sk-SK"/>
+          </a:p>
+        </p:txBody>
+      </p:sp>
+      <p:sp>
+        <p:nvSpPr>
+          <p:cNvPr id="13" name="BlokTextu 12">
+            <a:extLst>
+              <a:ext uri="{FF2B5EF4-FFF2-40B4-BE49-F238E27FC236}">
+                <a16:creationId xmlns:a16="http://schemas.microsoft.com/office/drawing/2014/main" id="{89A0B800-2929-41B7-A8FF-B13B233F7B36}"/>
+              </a:ext>
+            </a:extLst>
+          </p:cNvPr>
+          <p:cNvSpPr txBox="1"/>
+          <p:nvPr/>
+        </p:nvSpPr>
+        <p:spPr>
+          <a:xfrm>
+            <a:off x="4330893" y="4933014"/>
+            <a:ext cx="5421677" cy="369332"/>
+          </a:xfrm>
+          <a:prstGeom prst="rect">
+            <a:avLst/>
+          </a:prstGeom>
+          <a:noFill/>
+        </p:spPr>
+        <p:txBody>
+          <a:bodyPr wrap="none" rtlCol="0">
+            <a:spAutoFit/>
+          </a:bodyPr>
+          <a:lstStyle/>
+          <a:p>
+            <a:r>
+              <a:rPr lang="sk-SK" dirty="0"/>
+              <a:t>Získanie výstupu zo skriptu/ odmaskovaného textu</a:t>
+            </a:r>
+          </a:p>
+        </p:txBody>
+      </p:sp>
+      <p:sp>
+        <p:nvSpPr>
+          <p:cNvPr id="14" name="Šípka: nadol 13">
+            <a:extLst>
+              <a:ext uri="{FF2B5EF4-FFF2-40B4-BE49-F238E27FC236}">
+                <a16:creationId xmlns:a16="http://schemas.microsoft.com/office/drawing/2014/main" id="{51E5C8EA-65DD-4054-8403-3FB60004AB94}"/>
+              </a:ext>
+            </a:extLst>
+          </p:cNvPr>
+          <p:cNvSpPr/>
+          <p:nvPr/>
+        </p:nvSpPr>
+        <p:spPr>
+          <a:xfrm rot="6041165">
+            <a:off x="3787850" y="5806876"/>
+            <a:ext cx="701336" cy="461639"/>
+          </a:xfrm>
+          <a:prstGeom prst="downArrow">
+            <a:avLst/>
+          </a:prstGeom>
+        </p:spPr>
+        <p:style>
+          <a:lnRef idx="2">
+            <a:schemeClr val="accent4">
+              <a:shade val="50000"/>
+            </a:schemeClr>
+          </a:lnRef>
+          <a:fillRef idx="1">
+            <a:schemeClr val="accent4"/>
+          </a:fillRef>
+          <a:effectRef idx="0">
+            <a:schemeClr val="accent4"/>
+          </a:effectRef>
+          <a:fontRef idx="minor">
+            <a:schemeClr val="lt1"/>
+          </a:fontRef>
+        </p:style>
+        <p:txBody>
+          <a:bodyPr rtlCol="0" anchor="ctr"/>
+          <a:lstStyle/>
+          <a:p>
+            <a:pPr algn="ctr"/>
+            <a:endParaRPr lang="sk-SK"/>
+          </a:p>
+        </p:txBody>
+      </p:sp>
+      <p:sp>
+        <p:nvSpPr>
+          <p:cNvPr id="15" name="BlokTextu 14">
+            <a:extLst>
+              <a:ext uri="{FF2B5EF4-FFF2-40B4-BE49-F238E27FC236}">
+                <a16:creationId xmlns:a16="http://schemas.microsoft.com/office/drawing/2014/main" id="{C4AABA10-2DD4-4613-B368-3D75C30990B1}"/>
+              </a:ext>
+            </a:extLst>
+          </p:cNvPr>
+          <p:cNvSpPr txBox="1"/>
+          <p:nvPr/>
+        </p:nvSpPr>
+        <p:spPr>
+          <a:xfrm>
+            <a:off x="4459110" y="5869234"/>
+            <a:ext cx="3164649" cy="369332"/>
+          </a:xfrm>
+          <a:prstGeom prst="rect">
+            <a:avLst/>
+          </a:prstGeom>
+          <a:noFill/>
+        </p:spPr>
+        <p:txBody>
+          <a:bodyPr wrap="none" rtlCol="0">
+            <a:spAutoFit/>
+          </a:bodyPr>
+          <a:lstStyle/>
+          <a:p>
+            <a:r>
+              <a:rPr lang="sk-SK" dirty="0"/>
+              <a:t>Ukončenie práce so skriptom</a:t>
+            </a:r>
+          </a:p>
+        </p:txBody>
+      </p:sp>
+      <p:sp>
+        <p:nvSpPr>
+          <p:cNvPr id="16" name="BlokTextu 15">
+            <a:extLst>
+              <a:ext uri="{FF2B5EF4-FFF2-40B4-BE49-F238E27FC236}">
+                <a16:creationId xmlns:a16="http://schemas.microsoft.com/office/drawing/2014/main" id="{99103BC1-91F3-4290-A73C-19319A962BE8}"/>
+              </a:ext>
+            </a:extLst>
+          </p:cNvPr>
+          <p:cNvSpPr txBox="1"/>
+          <p:nvPr/>
+        </p:nvSpPr>
+        <p:spPr>
+          <a:xfrm>
+            <a:off x="7618948" y="2617575"/>
+            <a:ext cx="2614818" cy="400110"/>
+          </a:xfrm>
+          <a:prstGeom prst="rect">
+            <a:avLst/>
+          </a:prstGeom>
+          <a:noFill/>
+        </p:spPr>
+        <p:txBody>
+          <a:bodyPr wrap="none" rtlCol="0">
+            <a:spAutoFit/>
+          </a:bodyPr>
+          <a:lstStyle/>
+          <a:p>
+            <a:r>
+              <a:rPr lang="en-US" sz="2000" b="1" dirty="0"/>
+              <a:t>Bal</a:t>
+            </a:r>
+            <a:r>
+              <a:rPr lang="sk-SK" sz="2000" b="1" dirty="0" err="1"/>
+              <a:t>íček</a:t>
+            </a:r>
+            <a:r>
+              <a:rPr lang="sk-SK" sz="2000" b="1" dirty="0"/>
+              <a:t> </a:t>
+            </a:r>
+            <a:r>
+              <a:rPr lang="en-US" sz="2000" b="1" dirty="0"/>
+              <a:t>Python-shell</a:t>
+            </a:r>
+            <a:endParaRPr lang="sk-SK" sz="2000" b="1" dirty="0"/>
+          </a:p>
+        </p:txBody>
+      </p:sp>
+    </p:spTree>
+    <p:extLst>
+      <p:ext uri="{BB962C8B-B14F-4D97-AF65-F5344CB8AC3E}">
+        <p14:creationId xmlns:p14="http://schemas.microsoft.com/office/powerpoint/2010/main" val="3504478817"/>
+      </p:ext>
+    </p:extLst>
+  </p:cSld>
+  <p:clrMapOvr>
+    <a:masterClrMapping/>
+  </p:clrMapOvr>
+</p:sld>
+</file>
+
+<file path=ppt/slides/slide15.xml><?xml version="1.0" encoding="utf-8"?>
+<p:sld xmlns:a="http://schemas.openxmlformats.org/drawingml/2006/main" xmlns:r="http://schemas.openxmlformats.org/officeDocument/2006/relationships" xmlns:p="http://schemas.openxmlformats.org/presentationml/2006/main">
+  <p:cSld>
+    <p:spTree>
+      <p:nvGrpSpPr>
+        <p:cNvPr id="1" name=""/>
+        <p:cNvGrpSpPr/>
+        <p:nvPr/>
+      </p:nvGrpSpPr>
+      <p:grpSpPr>
+        <a:xfrm>
+          <a:off x="0" y="0"/>
+          <a:ext cx="0" cy="0"/>
+          <a:chOff x="0" y="0"/>
+          <a:chExt cx="0" cy="0"/>
+        </a:xfrm>
+      </p:grpSpPr>
+      <p:sp>
+        <p:nvSpPr>
+          <p:cNvPr id="2" name="Nadpis 1">
+            <a:extLst>
+              <a:ext uri="{FF2B5EF4-FFF2-40B4-BE49-F238E27FC236}">
+                <a16:creationId xmlns:a16="http://schemas.microsoft.com/office/drawing/2014/main" id="{2D9F4FC7-8AA4-4482-82A4-C66C3681CBAB}"/>
+              </a:ext>
+            </a:extLst>
+          </p:cNvPr>
+          <p:cNvSpPr>
+            <a:spLocks noGrp="1"/>
+          </p:cNvSpPr>
+          <p:nvPr>
+            <p:ph type="title"/>
+          </p:nvPr>
+        </p:nvSpPr>
+        <p:spPr>
+          <a:xfrm>
+            <a:off x="448734" y="234696"/>
+            <a:ext cx="8596668" cy="1320800"/>
+          </a:xfrm>
+        </p:spPr>
+        <p:txBody>
+          <a:bodyPr>
+            <a:noAutofit/>
+          </a:bodyPr>
+          <a:lstStyle/>
+          <a:p>
+            <a:r>
+              <a:rPr lang="sk-SK" sz="4800" b="1" dirty="0"/>
+              <a:t>Spustenie </a:t>
+            </a:r>
+            <a:r>
+              <a:rPr lang="sk-SK" sz="4800" b="1" dirty="0" err="1"/>
+              <a:t>NodeJS</a:t>
+            </a:r>
+            <a:r>
+              <a:rPr lang="sk-SK" sz="4800" b="1" dirty="0"/>
+              <a:t> servera – s </a:t>
+            </a:r>
+            <a:r>
+              <a:rPr lang="sk-SK" sz="4800" b="1" dirty="0" err="1"/>
+              <a:t>pythonom</a:t>
+            </a:r>
+            <a:endParaRPr lang="sk-SK" sz="4800" b="1" dirty="0"/>
+          </a:p>
+        </p:txBody>
+      </p:sp>
+      <p:sp>
+        <p:nvSpPr>
+          <p:cNvPr id="3" name="Zástupný objekt pre obsah 2">
+            <a:extLst>
+              <a:ext uri="{FF2B5EF4-FFF2-40B4-BE49-F238E27FC236}">
+                <a16:creationId xmlns:a16="http://schemas.microsoft.com/office/drawing/2014/main" id="{D4845586-6E28-41F3-8C18-78A99F9BD75E}"/>
+              </a:ext>
+            </a:extLst>
+          </p:cNvPr>
+          <p:cNvSpPr>
+            <a:spLocks noGrp="1"/>
+          </p:cNvSpPr>
+          <p:nvPr>
+            <p:ph idx="1"/>
+          </p:nvPr>
+        </p:nvSpPr>
+        <p:spPr/>
+        <p:txBody>
+          <a:bodyPr/>
+          <a:lstStyle/>
+          <a:p>
+            <a:pPr marL="0" indent="0">
+              <a:buNone/>
+            </a:pPr>
+            <a:endParaRPr lang="en-US" dirty="0"/>
+          </a:p>
+          <a:p>
+            <a:r>
+              <a:rPr lang="en-US" dirty="0"/>
+              <a:t>python -m </a:t>
+            </a:r>
+            <a:r>
+              <a:rPr lang="en-US" dirty="0" err="1"/>
+              <a:t>ensurepip</a:t>
+            </a:r>
+            <a:endParaRPr lang="en-US" dirty="0"/>
+          </a:p>
+          <a:p>
+            <a:r>
+              <a:rPr lang="en-US" dirty="0"/>
+              <a:t>python -m pip install </a:t>
+            </a:r>
+            <a:r>
+              <a:rPr lang="en-US" dirty="0" err="1"/>
+              <a:t>brotli</a:t>
+            </a:r>
+            <a:endParaRPr lang="sk-SK" dirty="0"/>
+          </a:p>
+          <a:p>
+            <a:endParaRPr lang="sk-SK" dirty="0"/>
+          </a:p>
+          <a:p>
+            <a:r>
+              <a:rPr lang="sk-SK" dirty="0"/>
+              <a:t>cd </a:t>
+            </a:r>
+            <a:r>
+              <a:rPr lang="sk-SK" dirty="0" err="1"/>
+              <a:t>nodejs</a:t>
+            </a:r>
+            <a:r>
+              <a:rPr lang="sk-SK" dirty="0"/>
+              <a:t>/server</a:t>
+            </a:r>
+          </a:p>
+          <a:p>
+            <a:r>
+              <a:rPr lang="sk-SK" dirty="0" err="1"/>
+              <a:t>npm</a:t>
+            </a:r>
+            <a:r>
+              <a:rPr lang="sk-SK" dirty="0"/>
+              <a:t> </a:t>
+            </a:r>
+            <a:r>
+              <a:rPr lang="sk-SK" dirty="0" err="1"/>
+              <a:t>install</a:t>
+            </a:r>
+            <a:endParaRPr lang="sk-SK" dirty="0"/>
+          </a:p>
+          <a:p>
+            <a:r>
+              <a:rPr lang="sk-SK" dirty="0" err="1"/>
+              <a:t>npm</a:t>
+            </a:r>
+            <a:r>
+              <a:rPr lang="sk-SK" dirty="0"/>
+              <a:t> </a:t>
+            </a:r>
+            <a:r>
+              <a:rPr lang="sk-SK" dirty="0" err="1"/>
+              <a:t>start</a:t>
+            </a:r>
+            <a:endParaRPr lang="sk-SK" dirty="0"/>
+          </a:p>
+        </p:txBody>
+      </p:sp>
+      <p:sp>
+        <p:nvSpPr>
+          <p:cNvPr id="4" name="Šípka: nadol 3">
+            <a:extLst>
+              <a:ext uri="{FF2B5EF4-FFF2-40B4-BE49-F238E27FC236}">
+                <a16:creationId xmlns:a16="http://schemas.microsoft.com/office/drawing/2014/main" id="{52008CFA-E284-42EE-A71A-1532FB7B22F6}"/>
+              </a:ext>
+            </a:extLst>
+          </p:cNvPr>
+          <p:cNvSpPr/>
+          <p:nvPr/>
+        </p:nvSpPr>
+        <p:spPr>
+          <a:xfrm rot="4615488">
+            <a:off x="3255176" y="2323563"/>
+            <a:ext cx="701336" cy="461639"/>
+          </a:xfrm>
+          <a:prstGeom prst="downArrow">
+            <a:avLst/>
+          </a:prstGeom>
+        </p:spPr>
+        <p:style>
+          <a:lnRef idx="2">
+            <a:schemeClr val="accent4">
+              <a:shade val="50000"/>
+            </a:schemeClr>
+          </a:lnRef>
+          <a:fillRef idx="1">
+            <a:schemeClr val="accent4"/>
+          </a:fillRef>
+          <a:effectRef idx="0">
+            <a:schemeClr val="accent4"/>
+          </a:effectRef>
+          <a:fontRef idx="minor">
+            <a:schemeClr val="lt1"/>
+          </a:fontRef>
+        </p:style>
+        <p:txBody>
+          <a:bodyPr rtlCol="0" anchor="ctr"/>
+          <a:lstStyle/>
+          <a:p>
+            <a:pPr algn="ctr"/>
+            <a:endParaRPr lang="sk-SK"/>
+          </a:p>
+        </p:txBody>
+      </p:sp>
+      <p:sp>
+        <p:nvSpPr>
+          <p:cNvPr id="5" name="BlokTextu 4">
+            <a:extLst>
+              <a:ext uri="{FF2B5EF4-FFF2-40B4-BE49-F238E27FC236}">
+                <a16:creationId xmlns:a16="http://schemas.microsoft.com/office/drawing/2014/main" id="{1352BF40-0F93-4BEA-B1D0-59243C5EF1F8}"/>
+              </a:ext>
+            </a:extLst>
+          </p:cNvPr>
+          <p:cNvSpPr txBox="1"/>
+          <p:nvPr/>
+        </p:nvSpPr>
+        <p:spPr>
+          <a:xfrm>
+            <a:off x="4014216" y="2267712"/>
+            <a:ext cx="3179140" cy="369332"/>
+          </a:xfrm>
+          <a:prstGeom prst="rect">
+            <a:avLst/>
+          </a:prstGeom>
+          <a:noFill/>
+        </p:spPr>
+        <p:txBody>
+          <a:bodyPr wrap="none" rtlCol="0">
+            <a:spAutoFit/>
+          </a:bodyPr>
+          <a:lstStyle/>
+          <a:p>
+            <a:r>
+              <a:rPr lang="sk-SK" dirty="0"/>
+              <a:t>Inštalácia </a:t>
+            </a:r>
+            <a:r>
+              <a:rPr lang="sk-SK" dirty="0" err="1"/>
+              <a:t>pip</a:t>
+            </a:r>
+            <a:r>
+              <a:rPr lang="sk-SK" dirty="0"/>
+              <a:t>-u vo </a:t>
+            </a:r>
+            <a:r>
+              <a:rPr lang="sk-SK" dirty="0" err="1"/>
+              <a:t>Windowse</a:t>
+            </a:r>
+            <a:endParaRPr lang="sk-SK" dirty="0"/>
+          </a:p>
+        </p:txBody>
+      </p:sp>
+      <p:sp>
+        <p:nvSpPr>
+          <p:cNvPr id="6" name="Šípka: nadol 5">
+            <a:extLst>
+              <a:ext uri="{FF2B5EF4-FFF2-40B4-BE49-F238E27FC236}">
+                <a16:creationId xmlns:a16="http://schemas.microsoft.com/office/drawing/2014/main" id="{13F00173-7CA4-412E-AA34-99A626A17465}"/>
+              </a:ext>
+            </a:extLst>
+          </p:cNvPr>
+          <p:cNvSpPr/>
+          <p:nvPr/>
+        </p:nvSpPr>
+        <p:spPr>
+          <a:xfrm rot="4615488">
+            <a:off x="3967714" y="2919857"/>
+            <a:ext cx="701336" cy="461639"/>
+          </a:xfrm>
+          <a:prstGeom prst="downArrow">
+            <a:avLst/>
+          </a:prstGeom>
+        </p:spPr>
+        <p:style>
+          <a:lnRef idx="2">
+            <a:schemeClr val="accent4">
+              <a:shade val="50000"/>
+            </a:schemeClr>
+          </a:lnRef>
+          <a:fillRef idx="1">
+            <a:schemeClr val="accent4"/>
+          </a:fillRef>
+          <a:effectRef idx="0">
+            <a:schemeClr val="accent4"/>
+          </a:effectRef>
+          <a:fontRef idx="minor">
+            <a:schemeClr val="lt1"/>
+          </a:fontRef>
+        </p:style>
+        <p:txBody>
+          <a:bodyPr rtlCol="0" anchor="ctr"/>
+          <a:lstStyle/>
+          <a:p>
+            <a:pPr algn="ctr"/>
+            <a:endParaRPr lang="sk-SK"/>
+          </a:p>
+        </p:txBody>
+      </p:sp>
+      <p:sp>
+        <p:nvSpPr>
+          <p:cNvPr id="7" name="BlokTextu 6">
+            <a:extLst>
+              <a:ext uri="{FF2B5EF4-FFF2-40B4-BE49-F238E27FC236}">
+                <a16:creationId xmlns:a16="http://schemas.microsoft.com/office/drawing/2014/main" id="{E6259ADB-2A50-407A-8048-4212211555F7}"/>
+              </a:ext>
+            </a:extLst>
+          </p:cNvPr>
+          <p:cNvSpPr txBox="1"/>
+          <p:nvPr/>
+        </p:nvSpPr>
+        <p:spPr>
+          <a:xfrm>
+            <a:off x="4679547" y="2827510"/>
+            <a:ext cx="3445174" cy="646331"/>
+          </a:xfrm>
+          <a:prstGeom prst="rect">
+            <a:avLst/>
+          </a:prstGeom>
+          <a:noFill/>
+        </p:spPr>
+        <p:txBody>
+          <a:bodyPr wrap="none" rtlCol="0">
+            <a:spAutoFit/>
+          </a:bodyPr>
+          <a:lstStyle/>
+          <a:p>
+            <a:r>
+              <a:rPr lang="sk-SK" dirty="0"/>
+              <a:t>Inštalácia závislosti pre</a:t>
+            </a:r>
+          </a:p>
+          <a:p>
+            <a:r>
+              <a:rPr lang="sk-SK" dirty="0"/>
+              <a:t> použitie </a:t>
+            </a:r>
+            <a:r>
+              <a:rPr lang="sk-SK" dirty="0" err="1"/>
+              <a:t>odmaskovacích</a:t>
+            </a:r>
+            <a:r>
+              <a:rPr lang="sk-SK" dirty="0"/>
+              <a:t> metód</a:t>
+            </a:r>
+          </a:p>
+        </p:txBody>
+      </p:sp>
+      <p:sp>
+        <p:nvSpPr>
+          <p:cNvPr id="8" name="Šípka: nadol 7">
+            <a:extLst>
+              <a:ext uri="{FF2B5EF4-FFF2-40B4-BE49-F238E27FC236}">
+                <a16:creationId xmlns:a16="http://schemas.microsoft.com/office/drawing/2014/main" id="{E336B352-C170-459B-8734-48446B2E3840}"/>
+              </a:ext>
+            </a:extLst>
+          </p:cNvPr>
+          <p:cNvSpPr/>
+          <p:nvPr/>
+        </p:nvSpPr>
+        <p:spPr>
+          <a:xfrm rot="4615488">
+            <a:off x="2263163" y="4087238"/>
+            <a:ext cx="701336" cy="461639"/>
+          </a:xfrm>
+          <a:prstGeom prst="downArrow">
+            <a:avLst/>
+          </a:prstGeom>
+        </p:spPr>
+        <p:style>
+          <a:lnRef idx="2">
+            <a:schemeClr val="accent4">
+              <a:shade val="50000"/>
+            </a:schemeClr>
+          </a:lnRef>
+          <a:fillRef idx="1">
+            <a:schemeClr val="accent4"/>
+          </a:fillRef>
+          <a:effectRef idx="0">
+            <a:schemeClr val="accent4"/>
+          </a:effectRef>
+          <a:fontRef idx="minor">
+            <a:schemeClr val="lt1"/>
+          </a:fontRef>
+        </p:style>
+        <p:txBody>
+          <a:bodyPr rtlCol="0" anchor="ctr"/>
+          <a:lstStyle/>
+          <a:p>
+            <a:pPr algn="ctr"/>
+            <a:endParaRPr lang="sk-SK" dirty="0"/>
+          </a:p>
+        </p:txBody>
+      </p:sp>
+      <p:sp>
+        <p:nvSpPr>
+          <p:cNvPr id="9" name="BlokTextu 8">
+            <a:extLst>
+              <a:ext uri="{FF2B5EF4-FFF2-40B4-BE49-F238E27FC236}">
+                <a16:creationId xmlns:a16="http://schemas.microsoft.com/office/drawing/2014/main" id="{E3B578DA-6AE1-43BC-B8F0-25716618FB9D}"/>
+              </a:ext>
+            </a:extLst>
+          </p:cNvPr>
+          <p:cNvSpPr txBox="1"/>
+          <p:nvPr/>
+        </p:nvSpPr>
+        <p:spPr>
+          <a:xfrm>
+            <a:off x="2910824" y="4047272"/>
+            <a:ext cx="2008883" cy="369332"/>
+          </a:xfrm>
+          <a:prstGeom prst="rect">
+            <a:avLst/>
+          </a:prstGeom>
+          <a:noFill/>
+        </p:spPr>
+        <p:txBody>
+          <a:bodyPr wrap="none" rtlCol="0">
+            <a:spAutoFit/>
+          </a:bodyPr>
+          <a:lstStyle/>
+          <a:p>
+            <a:r>
+              <a:rPr lang="sk-SK" dirty="0"/>
+              <a:t>inštalácia serveru</a:t>
+            </a:r>
+          </a:p>
+        </p:txBody>
+      </p:sp>
+      <p:sp>
+        <p:nvSpPr>
+          <p:cNvPr id="10" name="Šípka: nadol 9">
+            <a:extLst>
+              <a:ext uri="{FF2B5EF4-FFF2-40B4-BE49-F238E27FC236}">
+                <a16:creationId xmlns:a16="http://schemas.microsoft.com/office/drawing/2014/main" id="{BF42DFC3-9156-4D2A-BDA1-9B115B6F2C4D}"/>
+              </a:ext>
+            </a:extLst>
+          </p:cNvPr>
+          <p:cNvSpPr/>
+          <p:nvPr/>
+        </p:nvSpPr>
+        <p:spPr>
+          <a:xfrm rot="7267535">
+            <a:off x="2062611" y="4726289"/>
+            <a:ext cx="701336" cy="461639"/>
+          </a:xfrm>
+          <a:prstGeom prst="downArrow">
+            <a:avLst/>
+          </a:prstGeom>
+        </p:spPr>
+        <p:style>
+          <a:lnRef idx="2">
+            <a:schemeClr val="accent4">
+              <a:shade val="50000"/>
+            </a:schemeClr>
+          </a:lnRef>
+          <a:fillRef idx="1">
+            <a:schemeClr val="accent4"/>
+          </a:fillRef>
+          <a:effectRef idx="0">
+            <a:schemeClr val="accent4"/>
+          </a:effectRef>
+          <a:fontRef idx="minor">
+            <a:schemeClr val="lt1"/>
+          </a:fontRef>
+        </p:style>
+        <p:txBody>
+          <a:bodyPr rtlCol="0" anchor="ctr"/>
+          <a:lstStyle/>
+          <a:p>
+            <a:pPr algn="ctr"/>
+            <a:endParaRPr lang="sk-SK" dirty="0"/>
+          </a:p>
+        </p:txBody>
+      </p:sp>
+      <p:sp>
+        <p:nvSpPr>
+          <p:cNvPr id="11" name="BlokTextu 10">
+            <a:extLst>
+              <a:ext uri="{FF2B5EF4-FFF2-40B4-BE49-F238E27FC236}">
+                <a16:creationId xmlns:a16="http://schemas.microsoft.com/office/drawing/2014/main" id="{84E9B9BC-4CB7-4C74-9C09-588764877B80}"/>
+              </a:ext>
+            </a:extLst>
+          </p:cNvPr>
+          <p:cNvSpPr txBox="1"/>
+          <p:nvPr/>
+        </p:nvSpPr>
+        <p:spPr>
+          <a:xfrm>
+            <a:off x="2738185" y="4902051"/>
+            <a:ext cx="1997663" cy="369332"/>
+          </a:xfrm>
+          <a:prstGeom prst="rect">
+            <a:avLst/>
+          </a:prstGeom>
+          <a:noFill/>
+        </p:spPr>
+        <p:txBody>
+          <a:bodyPr wrap="none" rtlCol="0">
+            <a:spAutoFit/>
+          </a:bodyPr>
+          <a:lstStyle/>
+          <a:p>
+            <a:r>
+              <a:rPr lang="sk-SK" dirty="0"/>
+              <a:t>spustenie serveru</a:t>
+            </a:r>
+          </a:p>
+        </p:txBody>
+      </p:sp>
+    </p:spTree>
+    <p:extLst>
+      <p:ext uri="{BB962C8B-B14F-4D97-AF65-F5344CB8AC3E}">
+        <p14:creationId xmlns:p14="http://schemas.microsoft.com/office/powerpoint/2010/main" val="364263100"/>
+      </p:ext>
+    </p:extLst>
+  </p:cSld>
+  <p:clrMapOvr>
+    <a:masterClrMapping/>
+  </p:clrMapOvr>
+</p:sld>
+</file>
+
+<file path=ppt/slides/slide16.xml><?xml version="1.0" encoding="utf-8"?>
+<p:sld xmlns:a="http://schemas.openxmlformats.org/drawingml/2006/main" xmlns:r="http://schemas.openxmlformats.org/officeDocument/2006/relationships" xmlns:p="http://schemas.openxmlformats.org/presentationml/2006/main">
+  <p:cSld>
+    <p:spTree>
+      <p:nvGrpSpPr>
+        <p:cNvPr id="1" name=""/>
+        <p:cNvGrpSpPr/>
+        <p:nvPr/>
+      </p:nvGrpSpPr>
+      <p:grpSpPr>
+        <a:xfrm>
+          <a:off x="0" y="0"/>
+          <a:ext cx="0" cy="0"/>
+          <a:chOff x="0" y="0"/>
+          <a:chExt cx="0" cy="0"/>
+        </a:xfrm>
+      </p:grpSpPr>
+      <p:sp>
+        <p:nvSpPr>
+          <p:cNvPr id="2" name="Nadpis 1">
+            <a:extLst>
+              <a:ext uri="{FF2B5EF4-FFF2-40B4-BE49-F238E27FC236}">
                 <a16:creationId xmlns:a16="http://schemas.microsoft.com/office/drawing/2014/main" id="{BBB96D58-470D-413F-952F-1B6069BCCEBC}"/>
               </a:ext>
             </a:extLst>
@@ -18857,7 +22135,7 @@
 </p:sld>
 </file>
 
-<file path=ppt/slides/slide11.xml><?xml version="1.0" encoding="utf-8"?>
+<file path=ppt/slides/slide17.xml><?xml version="1.0" encoding="utf-8"?>
 <p:sld xmlns:a="http://schemas.openxmlformats.org/drawingml/2006/main" xmlns:r="http://schemas.openxmlformats.org/officeDocument/2006/relationships" xmlns:p="http://schemas.openxmlformats.org/presentationml/2006/main">
   <p:cSld>
     <p:spTree>
@@ -19542,7 +22820,7 @@
 </p:sld>
 </file>
 
-<file path=ppt/slides/slide12.xml><?xml version="1.0" encoding="utf-8"?>
+<file path=ppt/slides/slide18.xml><?xml version="1.0" encoding="utf-8"?>
 <p:sld xmlns:a="http://schemas.openxmlformats.org/drawingml/2006/main" xmlns:r="http://schemas.openxmlformats.org/officeDocument/2006/relationships" xmlns:p="http://schemas.openxmlformats.org/presentationml/2006/main">
   <p:cSld>
     <p:spTree>
@@ -19877,7 +23155,7 @@
 </p:sld>
 </file>
 
-<file path=ppt/slides/slide13.xml><?xml version="1.0" encoding="utf-8"?>
+<file path=ppt/slides/slide19.xml><?xml version="1.0" encoding="utf-8"?>
 <p:sld xmlns:a="http://schemas.openxmlformats.org/drawingml/2006/main" xmlns:r="http://schemas.openxmlformats.org/officeDocument/2006/relationships" xmlns:p="http://schemas.openxmlformats.org/presentationml/2006/main">
   <p:cSld>
     <p:spTree>
@@ -20032,141 +23310,6 @@
     <p:extLst>
       <p:ext uri="{BB962C8B-B14F-4D97-AF65-F5344CB8AC3E}">
         <p14:creationId xmlns:p14="http://schemas.microsoft.com/office/powerpoint/2010/main" val="1076659497"/>
-      </p:ext>
-    </p:extLst>
-  </p:cSld>
-  <p:clrMapOvr>
-    <a:masterClrMapping/>
-  </p:clrMapOvr>
-</p:sld>
-</file>
-
-<file path=ppt/slides/slide14.xml><?xml version="1.0" encoding="utf-8"?>
-<p:sld xmlns:a="http://schemas.openxmlformats.org/drawingml/2006/main" xmlns:r="http://schemas.openxmlformats.org/officeDocument/2006/relationships" xmlns:p="http://schemas.openxmlformats.org/presentationml/2006/main">
-  <p:cSld>
-    <p:spTree>
-      <p:nvGrpSpPr>
-        <p:cNvPr id="1" name=""/>
-        <p:cNvGrpSpPr/>
-        <p:nvPr/>
-      </p:nvGrpSpPr>
-      <p:grpSpPr>
-        <a:xfrm>
-          <a:off x="0" y="0"/>
-          <a:ext cx="0" cy="0"/>
-          <a:chOff x="0" y="0"/>
-          <a:chExt cx="0" cy="0"/>
-        </a:xfrm>
-      </p:grpSpPr>
-      <p:sp>
-        <p:nvSpPr>
-          <p:cNvPr id="2" name="Nadpis 1">
-            <a:extLst>
-              <a:ext uri="{FF2B5EF4-FFF2-40B4-BE49-F238E27FC236}">
-                <a16:creationId xmlns:a16="http://schemas.microsoft.com/office/drawing/2014/main" id="{144FBF9A-2F63-48F5-B7BA-6825A98BB13B}"/>
-              </a:ext>
-            </a:extLst>
-          </p:cNvPr>
-          <p:cNvSpPr>
-            <a:spLocks noGrp="1"/>
-          </p:cNvSpPr>
-          <p:nvPr>
-            <p:ph type="title"/>
-          </p:nvPr>
-        </p:nvSpPr>
-        <p:spPr>
-          <a:xfrm>
-            <a:off x="473148" y="1825840"/>
-            <a:ext cx="8596668" cy="1320800"/>
-          </a:xfrm>
-        </p:spPr>
-        <p:txBody>
-          <a:bodyPr>
-            <a:normAutofit/>
-          </a:bodyPr>
-          <a:lstStyle/>
-          <a:p>
-            <a:r>
-              <a:rPr lang="sk-SK" sz="5400" b="1" dirty="0"/>
-              <a:t>Odkaz na repozitár</a:t>
-            </a:r>
-          </a:p>
-        </p:txBody>
-      </p:sp>
-      <p:sp>
-        <p:nvSpPr>
-          <p:cNvPr id="3" name="Zástupný objekt pre obsah 2">
-            <a:extLst>
-              <a:ext uri="{FF2B5EF4-FFF2-40B4-BE49-F238E27FC236}">
-                <a16:creationId xmlns:a16="http://schemas.microsoft.com/office/drawing/2014/main" id="{04FC10AB-4B0E-4127-8EB8-8A4A94F41A8C}"/>
-              </a:ext>
-            </a:extLst>
-          </p:cNvPr>
-          <p:cNvSpPr>
-            <a:spLocks noGrp="1"/>
-          </p:cNvSpPr>
-          <p:nvPr>
-            <p:ph idx="1"/>
-          </p:nvPr>
-        </p:nvSpPr>
-        <p:spPr>
-          <a:xfrm>
-            <a:off x="979175" y="3237638"/>
-            <a:ext cx="8596668" cy="3880773"/>
-          </a:xfrm>
-        </p:spPr>
-        <p:txBody>
-          <a:bodyPr>
-            <a:normAutofit/>
-          </a:bodyPr>
-          <a:lstStyle/>
-          <a:p>
-            <a:r>
-              <a:rPr lang="sk-SK" sz="3200" b="1" dirty="0"/>
-              <a:t>https://github.com/jperdek/tokenCreator</a:t>
-            </a:r>
-          </a:p>
-        </p:txBody>
-      </p:sp>
-      <p:sp>
-        <p:nvSpPr>
-          <p:cNvPr id="4" name="BlokTextu 3">
-            <a:extLst>
-              <a:ext uri="{FF2B5EF4-FFF2-40B4-BE49-F238E27FC236}">
-                <a16:creationId xmlns:a16="http://schemas.microsoft.com/office/drawing/2014/main" id="{B43215AE-924B-4F3B-BDC9-62CE102C3EC3}"/>
-              </a:ext>
-            </a:extLst>
-          </p:cNvPr>
-          <p:cNvSpPr txBox="1"/>
-          <p:nvPr/>
-        </p:nvSpPr>
-        <p:spPr>
-          <a:xfrm>
-            <a:off x="5934457" y="4074851"/>
-            <a:ext cx="2550122" cy="369332"/>
-          </a:xfrm>
-          <a:prstGeom prst="rect">
-            <a:avLst/>
-          </a:prstGeom>
-          <a:noFill/>
-        </p:spPr>
-        <p:txBody>
-          <a:bodyPr wrap="none" rtlCol="0">
-            <a:spAutoFit/>
-          </a:bodyPr>
-          <a:lstStyle/>
-          <a:p>
-            <a:r>
-              <a:rPr lang="sk-SK" dirty="0"/>
-              <a:t>Vyžiadajte si prístup...</a:t>
-            </a:r>
-          </a:p>
-        </p:txBody>
-      </p:sp>
-    </p:spTree>
-    <p:extLst>
-      <p:ext uri="{BB962C8B-B14F-4D97-AF65-F5344CB8AC3E}">
-        <p14:creationId xmlns:p14="http://schemas.microsoft.com/office/powerpoint/2010/main" val="2253566020"/>
       </p:ext>
     </p:extLst>
   </p:cSld>
@@ -20739,6 +23882,141 @@
 </p:sld>
 </file>
 
+<file path=ppt/slides/slide20.xml><?xml version="1.0" encoding="utf-8"?>
+<p:sld xmlns:a="http://schemas.openxmlformats.org/drawingml/2006/main" xmlns:r="http://schemas.openxmlformats.org/officeDocument/2006/relationships" xmlns:p="http://schemas.openxmlformats.org/presentationml/2006/main">
+  <p:cSld>
+    <p:spTree>
+      <p:nvGrpSpPr>
+        <p:cNvPr id="1" name=""/>
+        <p:cNvGrpSpPr/>
+        <p:nvPr/>
+      </p:nvGrpSpPr>
+      <p:grpSpPr>
+        <a:xfrm>
+          <a:off x="0" y="0"/>
+          <a:ext cx="0" cy="0"/>
+          <a:chOff x="0" y="0"/>
+          <a:chExt cx="0" cy="0"/>
+        </a:xfrm>
+      </p:grpSpPr>
+      <p:sp>
+        <p:nvSpPr>
+          <p:cNvPr id="2" name="Nadpis 1">
+            <a:extLst>
+              <a:ext uri="{FF2B5EF4-FFF2-40B4-BE49-F238E27FC236}">
+                <a16:creationId xmlns:a16="http://schemas.microsoft.com/office/drawing/2014/main" id="{144FBF9A-2F63-48F5-B7BA-6825A98BB13B}"/>
+              </a:ext>
+            </a:extLst>
+          </p:cNvPr>
+          <p:cNvSpPr>
+            <a:spLocks noGrp="1"/>
+          </p:cNvSpPr>
+          <p:nvPr>
+            <p:ph type="title"/>
+          </p:nvPr>
+        </p:nvSpPr>
+        <p:spPr>
+          <a:xfrm>
+            <a:off x="473148" y="1825840"/>
+            <a:ext cx="8596668" cy="1320800"/>
+          </a:xfrm>
+        </p:spPr>
+        <p:txBody>
+          <a:bodyPr>
+            <a:normAutofit/>
+          </a:bodyPr>
+          <a:lstStyle/>
+          <a:p>
+            <a:r>
+              <a:rPr lang="sk-SK" sz="5400" b="1" dirty="0"/>
+              <a:t>Odkaz na repozitár</a:t>
+            </a:r>
+          </a:p>
+        </p:txBody>
+      </p:sp>
+      <p:sp>
+        <p:nvSpPr>
+          <p:cNvPr id="3" name="Zástupný objekt pre obsah 2">
+            <a:extLst>
+              <a:ext uri="{FF2B5EF4-FFF2-40B4-BE49-F238E27FC236}">
+                <a16:creationId xmlns:a16="http://schemas.microsoft.com/office/drawing/2014/main" id="{04FC10AB-4B0E-4127-8EB8-8A4A94F41A8C}"/>
+              </a:ext>
+            </a:extLst>
+          </p:cNvPr>
+          <p:cNvSpPr>
+            <a:spLocks noGrp="1"/>
+          </p:cNvSpPr>
+          <p:nvPr>
+            <p:ph idx="1"/>
+          </p:nvPr>
+        </p:nvSpPr>
+        <p:spPr>
+          <a:xfrm>
+            <a:off x="979175" y="3237638"/>
+            <a:ext cx="8596668" cy="3880773"/>
+          </a:xfrm>
+        </p:spPr>
+        <p:txBody>
+          <a:bodyPr>
+            <a:normAutofit/>
+          </a:bodyPr>
+          <a:lstStyle/>
+          <a:p>
+            <a:r>
+              <a:rPr lang="sk-SK" sz="3200" b="1" dirty="0"/>
+              <a:t>https://github.com/jperdek/tokenCreator</a:t>
+            </a:r>
+          </a:p>
+        </p:txBody>
+      </p:sp>
+      <p:sp>
+        <p:nvSpPr>
+          <p:cNvPr id="4" name="BlokTextu 3">
+            <a:extLst>
+              <a:ext uri="{FF2B5EF4-FFF2-40B4-BE49-F238E27FC236}">
+                <a16:creationId xmlns:a16="http://schemas.microsoft.com/office/drawing/2014/main" id="{B43215AE-924B-4F3B-BDC9-62CE102C3EC3}"/>
+              </a:ext>
+            </a:extLst>
+          </p:cNvPr>
+          <p:cNvSpPr txBox="1"/>
+          <p:nvPr/>
+        </p:nvSpPr>
+        <p:spPr>
+          <a:xfrm>
+            <a:off x="5934457" y="4074851"/>
+            <a:ext cx="2550122" cy="369332"/>
+          </a:xfrm>
+          <a:prstGeom prst="rect">
+            <a:avLst/>
+          </a:prstGeom>
+          <a:noFill/>
+        </p:spPr>
+        <p:txBody>
+          <a:bodyPr wrap="none" rtlCol="0">
+            <a:spAutoFit/>
+          </a:bodyPr>
+          <a:lstStyle/>
+          <a:p>
+            <a:r>
+              <a:rPr lang="sk-SK" dirty="0"/>
+              <a:t>Vyžiadajte si prístup...</a:t>
+            </a:r>
+          </a:p>
+        </p:txBody>
+      </p:sp>
+    </p:spTree>
+    <p:extLst>
+      <p:ext uri="{BB962C8B-B14F-4D97-AF65-F5344CB8AC3E}">
+        <p14:creationId xmlns:p14="http://schemas.microsoft.com/office/powerpoint/2010/main" val="2253566020"/>
+      </p:ext>
+    </p:extLst>
+  </p:cSld>
+  <p:clrMapOvr>
+    <a:masterClrMapping/>
+  </p:clrMapOvr>
+</p:sld>
+</file>
+
 <file path=ppt/slides/slide3.xml><?xml version="1.0" encoding="utf-8"?>
 <p:sld xmlns:a="http://schemas.openxmlformats.org/drawingml/2006/main" xmlns:r="http://schemas.openxmlformats.org/officeDocument/2006/relationships" xmlns:p="http://schemas.openxmlformats.org/presentationml/2006/main">
   <p:cSld>
@@ -24476,7 +27754,7 @@
         </p:spPr>
         <p:txBody>
           <a:bodyPr>
-            <a:normAutofit lnSpcReduction="10000"/>
+            <a:normAutofit fontScale="92500"/>
           </a:bodyPr>
           <a:lstStyle/>
           <a:p>
@@ -24778,34 +28056,70 @@
             </a:r>
             <a:r>
               <a:rPr lang="sk-SK" dirty="0"/>
-              <a:t> = {element: "</a:t>
-            </a:r>
-            <a:r>
-              <a:rPr lang="sk-SK" dirty="0" err="1"/>
+              <a:t> = {element: </a:t>
+            </a:r>
+            <a:r>
+              <a:rPr lang="sk-SK" sz="2000" b="1" dirty="0">
+                <a:solidFill>
+                  <a:srgbClr val="0070C0"/>
+                </a:solidFill>
+              </a:rPr>
+              <a:t>"</a:t>
+            </a:r>
+            <a:r>
+              <a:rPr lang="sk-SK" sz="2000" b="1" dirty="0" err="1">
+                <a:solidFill>
+                  <a:srgbClr val="0070C0"/>
+                </a:solidFill>
+              </a:rPr>
               <a:t>Some</a:t>
             </a:r>
             <a:r>
-              <a:rPr lang="sk-SK" dirty="0"/>
+              <a:rPr lang="sk-SK" sz="2000" b="1" dirty="0">
+                <a:solidFill>
+                  <a:srgbClr val="0070C0"/>
+                </a:solidFill>
+              </a:rPr>
               <a:t> </a:t>
             </a:r>
             <a:r>
-              <a:rPr lang="sk-SK" dirty="0" err="1"/>
+              <a:rPr lang="sk-SK" sz="2000" b="1" dirty="0" err="1">
+                <a:solidFill>
+                  <a:srgbClr val="0070C0"/>
+                </a:solidFill>
+              </a:rPr>
               <a:t>interesting</a:t>
             </a:r>
             <a:r>
-              <a:rPr lang="sk-SK" dirty="0"/>
+              <a:rPr lang="sk-SK" sz="2000" b="1" dirty="0">
+                <a:solidFill>
+                  <a:srgbClr val="0070C0"/>
+                </a:solidFill>
+              </a:rPr>
               <a:t> </a:t>
             </a:r>
             <a:r>
-              <a:rPr lang="sk-SK" dirty="0" err="1"/>
+              <a:rPr lang="sk-SK" sz="2000" b="1" dirty="0" err="1">
+                <a:solidFill>
+                  <a:srgbClr val="0070C0"/>
+                </a:solidFill>
+              </a:rPr>
               <a:t>activity</a:t>
             </a:r>
             <a:r>
-              <a:rPr lang="sk-SK" dirty="0"/>
+              <a:rPr lang="sk-SK" sz="2000" b="1" dirty="0">
+                <a:solidFill>
+                  <a:srgbClr val="0070C0"/>
+                </a:solidFill>
+              </a:rPr>
               <a:t> at: " + </a:t>
             </a:r>
             <a:r>
-              <a:rPr lang="sk-SK" dirty="0" err="1"/>
+              <a:rPr lang="sk-SK" sz="2000" b="1" dirty="0" err="1">
+                <a:solidFill>
+                  <a:srgbClr val="0070C0"/>
+                </a:solidFill>
+              </a:rPr>
               <a:t>strDateTime</a:t>
             </a:r>
             <a:r>

</xml_diff>

<commit_message>
Added images to report
</commit_message>
<xml_diff>
--- a/presentations/Detekcia nepovoleneho prístupu kustomizáciou nízko interaktívnych honeypotov2.pptx
+++ b/presentations/Detekcia nepovoleneho prístupu kustomizáciou nízko interaktívnych honeypotov2.pptx
@@ -11838,7 +11838,7 @@
           <a:p>
             <a:fld id="{FCA34E4B-FD8B-44EC-ACC1-52060C9F50A5}" type="datetimeFigureOut">
               <a:rPr lang="sk-SK" smtClean="0"/>
-              <a:t>16. 4. 2022</a:t>
+              <a:t>20. 4. 2022</a:t>
             </a:fld>
             <a:endParaRPr lang="sk-SK"/>
           </a:p>
@@ -12827,7 +12827,7 @@
           <a:p>
             <a:fld id="{D150AA39-B59D-403E-8167-B52EA36C0242}" type="datetimeFigureOut">
               <a:rPr lang="sk-SK" smtClean="0"/>
-              <a:t>16. 4. 2022</a:t>
+              <a:t>20. 4. 2022</a:t>
             </a:fld>
             <a:endParaRPr lang="sk-SK"/>
           </a:p>
@@ -13078,7 +13078,7 @@
           <a:p>
             <a:fld id="{D150AA39-B59D-403E-8167-B52EA36C0242}" type="datetimeFigureOut">
               <a:rPr lang="sk-SK" smtClean="0"/>
-              <a:t>16. 4. 2022</a:t>
+              <a:t>20. 4. 2022</a:t>
             </a:fld>
             <a:endParaRPr lang="sk-SK"/>
           </a:p>
@@ -13392,7 +13392,7 @@
           <a:p>
             <a:fld id="{D150AA39-B59D-403E-8167-B52EA36C0242}" type="datetimeFigureOut">
               <a:rPr lang="sk-SK" smtClean="0"/>
-              <a:t>16. 4. 2022</a:t>
+              <a:t>20. 4. 2022</a:t>
             </a:fld>
             <a:endParaRPr lang="sk-SK"/>
           </a:p>
@@ -13733,7 +13733,7 @@
           <a:p>
             <a:fld id="{D150AA39-B59D-403E-8167-B52EA36C0242}" type="datetimeFigureOut">
               <a:rPr lang="sk-SK" smtClean="0"/>
-              <a:t>16. 4. 2022</a:t>
+              <a:t>20. 4. 2022</a:t>
             </a:fld>
             <a:endParaRPr lang="sk-SK"/>
           </a:p>
@@ -14047,7 +14047,7 @@
           <a:p>
             <a:fld id="{D150AA39-B59D-403E-8167-B52EA36C0242}" type="datetimeFigureOut">
               <a:rPr lang="sk-SK" smtClean="0"/>
-              <a:t>16. 4. 2022</a:t>
+              <a:t>20. 4. 2022</a:t>
             </a:fld>
             <a:endParaRPr lang="sk-SK"/>
           </a:p>
@@ -14440,7 +14440,7 @@
           <a:p>
             <a:fld id="{D150AA39-B59D-403E-8167-B52EA36C0242}" type="datetimeFigureOut">
               <a:rPr lang="sk-SK" smtClean="0"/>
-              <a:t>16. 4. 2022</a:t>
+              <a:t>20. 4. 2022</a:t>
             </a:fld>
             <a:endParaRPr lang="sk-SK"/>
           </a:p>
@@ -14610,7 +14610,7 @@
           <a:p>
             <a:fld id="{D150AA39-B59D-403E-8167-B52EA36C0242}" type="datetimeFigureOut">
               <a:rPr lang="sk-SK" smtClean="0"/>
-              <a:t>16. 4. 2022</a:t>
+              <a:t>20. 4. 2022</a:t>
             </a:fld>
             <a:endParaRPr lang="sk-SK"/>
           </a:p>
@@ -14790,7 +14790,7 @@
           <a:p>
             <a:fld id="{D150AA39-B59D-403E-8167-B52EA36C0242}" type="datetimeFigureOut">
               <a:rPr lang="sk-SK" smtClean="0"/>
-              <a:t>16. 4. 2022</a:t>
+              <a:t>20. 4. 2022</a:t>
             </a:fld>
             <a:endParaRPr lang="sk-SK"/>
           </a:p>
@@ -14966,7 +14966,7 @@
           <a:p>
             <a:fld id="{D150AA39-B59D-403E-8167-B52EA36C0242}" type="datetimeFigureOut">
               <a:rPr lang="sk-SK" smtClean="0"/>
-              <a:t>16. 4. 2022</a:t>
+              <a:t>20. 4. 2022</a:t>
             </a:fld>
             <a:endParaRPr lang="sk-SK"/>
           </a:p>
@@ -15213,7 +15213,7 @@
           <a:p>
             <a:fld id="{D150AA39-B59D-403E-8167-B52EA36C0242}" type="datetimeFigureOut">
               <a:rPr lang="sk-SK" smtClean="0"/>
-              <a:t>16. 4. 2022</a:t>
+              <a:t>20. 4. 2022</a:t>
             </a:fld>
             <a:endParaRPr lang="sk-SK"/>
           </a:p>
@@ -15445,7 +15445,7 @@
           <a:p>
             <a:fld id="{D150AA39-B59D-403E-8167-B52EA36C0242}" type="datetimeFigureOut">
               <a:rPr lang="sk-SK" smtClean="0"/>
-              <a:t>16. 4. 2022</a:t>
+              <a:t>20. 4. 2022</a:t>
             </a:fld>
             <a:endParaRPr lang="sk-SK"/>
           </a:p>
@@ -15819,7 +15819,7 @@
           <a:p>
             <a:fld id="{D150AA39-B59D-403E-8167-B52EA36C0242}" type="datetimeFigureOut">
               <a:rPr lang="sk-SK" smtClean="0"/>
-              <a:t>16. 4. 2022</a:t>
+              <a:t>20. 4. 2022</a:t>
             </a:fld>
             <a:endParaRPr lang="sk-SK"/>
           </a:p>
@@ -15942,7 +15942,7 @@
           <a:p>
             <a:fld id="{D150AA39-B59D-403E-8167-B52EA36C0242}" type="datetimeFigureOut">
               <a:rPr lang="sk-SK" smtClean="0"/>
-              <a:t>16. 4. 2022</a:t>
+              <a:t>20. 4. 2022</a:t>
             </a:fld>
             <a:endParaRPr lang="sk-SK"/>
           </a:p>
@@ -16037,7 +16037,7 @@
           <a:p>
             <a:fld id="{D150AA39-B59D-403E-8167-B52EA36C0242}" type="datetimeFigureOut">
               <a:rPr lang="sk-SK" smtClean="0"/>
-              <a:t>16. 4. 2022</a:t>
+              <a:t>20. 4. 2022</a:t>
             </a:fld>
             <a:endParaRPr lang="sk-SK"/>
           </a:p>
@@ -16292,7 +16292,7 @@
           <a:p>
             <a:fld id="{D150AA39-B59D-403E-8167-B52EA36C0242}" type="datetimeFigureOut">
               <a:rPr lang="sk-SK" smtClean="0"/>
-              <a:t>16. 4. 2022</a:t>
+              <a:t>20. 4. 2022</a:t>
             </a:fld>
             <a:endParaRPr lang="sk-SK"/>
           </a:p>
@@ -16555,7 +16555,7 @@
           <a:p>
             <a:fld id="{D150AA39-B59D-403E-8167-B52EA36C0242}" type="datetimeFigureOut">
               <a:rPr lang="sk-SK" smtClean="0"/>
-              <a:t>16. 4. 2022</a:t>
+              <a:t>20. 4. 2022</a:t>
             </a:fld>
             <a:endParaRPr lang="sk-SK"/>
           </a:p>
@@ -17298,7 +17298,7 @@
           <a:p>
             <a:fld id="{D150AA39-B59D-403E-8167-B52EA36C0242}" type="datetimeFigureOut">
               <a:rPr lang="sk-SK" smtClean="0"/>
-              <a:t>16. 4. 2022</a:t>
+              <a:t>20. 4. 2022</a:t>
             </a:fld>
             <a:endParaRPr lang="sk-SK"/>
           </a:p>
@@ -18325,7 +18325,7 @@
         <p:spPr>
           <a:xfrm>
             <a:off x="426129" y="302505"/>
-            <a:ext cx="5897768" cy="369332"/>
+            <a:ext cx="5684569" cy="369332"/>
           </a:xfrm>
           <a:prstGeom prst="rect">
             <a:avLst/>
@@ -18340,15 +18340,7 @@
           <a:p>
             <a:r>
               <a:rPr lang="sk-SK" b="1" dirty="0"/>
-              <a:t>2. Odchytenie </a:t>
-            </a:r>
-            <a:r>
-              <a:rPr lang="sk-SK" b="1" dirty="0" err="1"/>
-              <a:t>requestu</a:t>
-            </a:r>
-            <a:r>
-              <a:rPr lang="sk-SK" b="1" dirty="0"/>
-              <a:t> logujúceho aktivitu útočníka</a:t>
+              <a:t>2. Odchytenie dopytu logujúceho aktivitu útočníka</a:t>
             </a:r>
           </a:p>
         </p:txBody>
@@ -26210,7 +26202,7 @@
         </p:nvSpPr>
         <p:spPr>
           <a:xfrm>
-            <a:off x="4815568" y="0"/>
+            <a:off x="4815568" y="34800"/>
             <a:ext cx="10153425" cy="1320800"/>
           </a:xfrm>
         </p:spPr>

</xml_diff>